<commit_message>
Make some edits to the presentation & readme
</commit_message>
<xml_diff>
--- a/Lab 2/Green Lab - Lab 2.pptx
+++ b/Lab 2/Green Lab - Lab 2.pptx
@@ -20,23 +20,25 @@
     <p:sldId id="264" r:id="rId14"/>
     <p:sldId id="265" r:id="rId15"/>
     <p:sldId id="266" r:id="rId16"/>
+    <p:sldId id="267" r:id="rId17"/>
+    <p:sldId id="268" r:id="rId18"/>
   </p:sldIdLst>
   <p:sldSz cy="6858000" cx="9144000"/>
   <p:notesSz cx="6858000" cy="9144000"/>
   <p:embeddedFontLst>
     <p:embeddedFont>
       <p:font typeface="Lato"/>
-      <p:regular r:id="rId17"/>
-      <p:bold r:id="rId18"/>
-      <p:italic r:id="rId19"/>
-      <p:boldItalic r:id="rId20"/>
+      <p:regular r:id="rId19"/>
+      <p:bold r:id="rId20"/>
+      <p:italic r:id="rId21"/>
+      <p:boldItalic r:id="rId22"/>
     </p:embeddedFont>
     <p:embeddedFont>
       <p:font typeface="Lato Light"/>
-      <p:regular r:id="rId21"/>
-      <p:bold r:id="rId22"/>
-      <p:italic r:id="rId23"/>
-      <p:boldItalic r:id="rId24"/>
+      <p:regular r:id="rId23"/>
+      <p:bold r:id="rId24"/>
+      <p:italic r:id="rId25"/>
+      <p:boldItalic r:id="rId26"/>
     </p:embeddedFont>
   </p:embeddedFontLst>
   <p:defaultTextStyle>
@@ -270,7 +272,7 @@
   </p:defaultTextStyle>
   <p:extLst>
     <p:ext uri="GoogleSlidesCustomDataVersion2">
-      <go:slidesCustomData xmlns:go="http://customooxmlschemas.google.com/" r:id="rId25" roundtripDataSignature="AMtx7mi2zlpAEo3TgWAqBxBmQaNl20i92Q=="/>
+      <go:slidesCustomData xmlns:go="http://customooxmlschemas.google.com/" r:id="rId27" roundtripDataSignature="AMtx7miLnlGe3he06kzhbyCVvmLNwy7XaA=="/>
     </p:ext>
   </p:extLst>
 </p:presentation>
@@ -984,7 +986,7 @@
       </p:grpSpPr>
       <p:sp>
         <p:nvSpPr>
-          <p:cNvPr id="131" name="Google Shape;131;g37e4d9bba6d_0_39:notes"/>
+          <p:cNvPr id="131" name="Google Shape;131;g37fcc201e2e_1_0:notes"/>
           <p:cNvSpPr txBox="1"/>
           <p:nvPr>
             <p:ph idx="1" type="body"/>
@@ -1035,7 +1037,7 @@
       </p:sp>
       <p:sp>
         <p:nvSpPr>
-          <p:cNvPr id="132" name="Google Shape;132;g37e4d9bba6d_0_39:notes"/>
+          <p:cNvPr id="132" name="Google Shape;132;g37fcc201e2e_1_0:notes"/>
           <p:cNvSpPr/>
           <p:nvPr>
             <p:ph idx="2" type="sldImg"/>
@@ -1105,7 +1107,7 @@
       </p:grpSpPr>
       <p:sp>
         <p:nvSpPr>
-          <p:cNvPr id="139" name="Google Shape;139;g37e4d9bba6d_0_46:notes"/>
+          <p:cNvPr id="139" name="Google Shape;139;g37e4d9bba6d_0_39:notes"/>
           <p:cNvSpPr txBox="1"/>
           <p:nvPr>
             <p:ph idx="1" type="body"/>
@@ -1156,7 +1158,249 @@
       </p:sp>
       <p:sp>
         <p:nvSpPr>
-          <p:cNvPr id="140" name="Google Shape;140;g37e4d9bba6d_0_46:notes"/>
+          <p:cNvPr id="140" name="Google Shape;140;g37e4d9bba6d_0_39:notes"/>
+          <p:cNvSpPr/>
+          <p:nvPr>
+            <p:ph idx="2" type="sldImg"/>
+          </p:nvPr>
+        </p:nvSpPr>
+        <p:spPr>
+          <a:xfrm>
+            <a:off x="1143000" y="685800"/>
+            <a:ext cx="4572000" cy="3429000"/>
+          </a:xfrm>
+          <a:custGeom>
+            <a:rect b="b" l="l" r="r" t="t"/>
+            <a:pathLst>
+              <a:path extrusionOk="0" h="120000" w="120000">
+                <a:moveTo>
+                  <a:pt x="0" y="0"/>
+                </a:moveTo>
+                <a:lnTo>
+                  <a:pt x="120000" y="0"/>
+                </a:lnTo>
+                <a:lnTo>
+                  <a:pt x="120000" y="120000"/>
+                </a:lnTo>
+                <a:lnTo>
+                  <a:pt x="0" y="120000"/>
+                </a:lnTo>
+                <a:close/>
+              </a:path>
+            </a:pathLst>
+          </a:custGeom>
+          <a:noFill/>
+          <a:ln cap="flat" cmpd="sng" w="9525">
+            <a:solidFill>
+              <a:srgbClr val="000000"/>
+            </a:solidFill>
+            <a:prstDash val="solid"/>
+            <a:round/>
+            <a:headEnd len="sm" w="sm" type="none"/>
+            <a:tailEnd len="sm" w="sm" type="none"/>
+          </a:ln>
+        </p:spPr>
+      </p:sp>
+    </p:spTree>
+  </p:cSld>
+  <p:clrMapOvr>
+    <a:masterClrMapping/>
+  </p:clrMapOvr>
+</p:notes>
+</file>
+
+<file path=ppt/notesSlides/notesSlide12.xml><?xml version="1.0" encoding="utf-8"?>
+<p:notes xmlns:a="http://schemas.openxmlformats.org/drawingml/2006/main" xmlns:r="http://schemas.openxmlformats.org/officeDocument/2006/relationships" xmlns:mc="http://schemas.openxmlformats.org/markup-compatibility/2006" xmlns:mv="urn:schemas-microsoft-com:mac:vml" xmlns:p="http://schemas.openxmlformats.org/presentationml/2006/main" xmlns:c="http://schemas.openxmlformats.org/drawingml/2006/chart" xmlns:dgm="http://schemas.openxmlformats.org/drawingml/2006/diagram" xmlns:o="urn:schemas-microsoft-com:office:office" xmlns:v="urn:schemas-microsoft-com:vml" xmlns:pvml="urn:schemas-microsoft-com:office:powerpoint" xmlns:com="http://schemas.openxmlformats.org/drawingml/2006/compatibility" xmlns:p14="http://schemas.microsoft.com/office/powerpoint/2010/main" xmlns:p15="http://schemas.microsoft.com/office/powerpoint/2012/main" xmlns:ahyp="http://schemas.microsoft.com/office/drawing/2018/hyperlinkcolor" showMasterPhAnim="0" showMasterSp="0">
+  <p:cSld>
+    <p:spTree>
+      <p:nvGrpSpPr>
+        <p:cNvPr id="146" name="Shape 146"/>
+        <p:cNvGrpSpPr/>
+        <p:nvPr/>
+      </p:nvGrpSpPr>
+      <p:grpSpPr>
+        <a:xfrm>
+          <a:off x="0" y="0"/>
+          <a:ext cx="0" cy="0"/>
+          <a:chOff x="0" y="0"/>
+          <a:chExt cx="0" cy="0"/>
+        </a:xfrm>
+      </p:grpSpPr>
+      <p:sp>
+        <p:nvSpPr>
+          <p:cNvPr id="147" name="Google Shape;147;g37e4d9bba6d_0_46:notes"/>
+          <p:cNvSpPr txBox="1"/>
+          <p:nvPr>
+            <p:ph idx="1" type="body"/>
+          </p:nvPr>
+        </p:nvSpPr>
+        <p:spPr>
+          <a:xfrm>
+            <a:off x="685800" y="4343400"/>
+            <a:ext cx="5486400" cy="4114800"/>
+          </a:xfrm>
+          <a:prstGeom prst="rect">
+            <a:avLst/>
+          </a:prstGeom>
+          <a:noFill/>
+          <a:ln>
+            <a:noFill/>
+          </a:ln>
+        </p:spPr>
+        <p:txBody>
+          <a:bodyPr anchorCtr="0" anchor="ctr" bIns="91425" lIns="91425" spcFirstLastPara="1" rIns="91425" wrap="square" tIns="91425">
+            <a:noAutofit/>
+          </a:bodyPr>
+          <a:lstStyle/>
+          <a:p>
+            <a:pPr indent="0" lvl="0" marL="0" rtl="0" algn="l">
+              <a:lnSpc>
+                <a:spcPct val="100000"/>
+              </a:lnSpc>
+              <a:spcBef>
+                <a:spcPts val="0"/>
+              </a:spcBef>
+              <a:spcAft>
+                <a:spcPts val="0"/>
+              </a:spcAft>
+              <a:buClr>
+                <a:schemeClr val="dk1"/>
+              </a:buClr>
+              <a:buSzPts val="1100"/>
+              <a:buFont typeface="Lato Light"/>
+              <a:buNone/>
+            </a:pPr>
+            <a:r>
+              <a:t/>
+            </a:r>
+            <a:endParaRPr/>
+          </a:p>
+        </p:txBody>
+      </p:sp>
+      <p:sp>
+        <p:nvSpPr>
+          <p:cNvPr id="148" name="Google Shape;148;g37e4d9bba6d_0_46:notes"/>
+          <p:cNvSpPr/>
+          <p:nvPr>
+            <p:ph idx="2" type="sldImg"/>
+          </p:nvPr>
+        </p:nvSpPr>
+        <p:spPr>
+          <a:xfrm>
+            <a:off x="1143000" y="685800"/>
+            <a:ext cx="4572000" cy="3429000"/>
+          </a:xfrm>
+          <a:custGeom>
+            <a:rect b="b" l="l" r="r" t="t"/>
+            <a:pathLst>
+              <a:path extrusionOk="0" h="120000" w="120000">
+                <a:moveTo>
+                  <a:pt x="0" y="0"/>
+                </a:moveTo>
+                <a:lnTo>
+                  <a:pt x="120000" y="0"/>
+                </a:lnTo>
+                <a:lnTo>
+                  <a:pt x="120000" y="120000"/>
+                </a:lnTo>
+                <a:lnTo>
+                  <a:pt x="0" y="120000"/>
+                </a:lnTo>
+                <a:close/>
+              </a:path>
+            </a:pathLst>
+          </a:custGeom>
+          <a:noFill/>
+          <a:ln cap="flat" cmpd="sng" w="9525">
+            <a:solidFill>
+              <a:srgbClr val="000000"/>
+            </a:solidFill>
+            <a:prstDash val="solid"/>
+            <a:round/>
+            <a:headEnd len="sm" w="sm" type="none"/>
+            <a:tailEnd len="sm" w="sm" type="none"/>
+          </a:ln>
+        </p:spPr>
+      </p:sp>
+    </p:spTree>
+  </p:cSld>
+  <p:clrMapOvr>
+    <a:masterClrMapping/>
+  </p:clrMapOvr>
+</p:notes>
+</file>
+
+<file path=ppt/notesSlides/notesSlide13.xml><?xml version="1.0" encoding="utf-8"?>
+<p:notes xmlns:a="http://schemas.openxmlformats.org/drawingml/2006/main" xmlns:r="http://schemas.openxmlformats.org/officeDocument/2006/relationships" xmlns:mc="http://schemas.openxmlformats.org/markup-compatibility/2006" xmlns:mv="urn:schemas-microsoft-com:mac:vml" xmlns:p="http://schemas.openxmlformats.org/presentationml/2006/main" xmlns:c="http://schemas.openxmlformats.org/drawingml/2006/chart" xmlns:dgm="http://schemas.openxmlformats.org/drawingml/2006/diagram" xmlns:o="urn:schemas-microsoft-com:office:office" xmlns:v="urn:schemas-microsoft-com:vml" xmlns:pvml="urn:schemas-microsoft-com:office:powerpoint" xmlns:com="http://schemas.openxmlformats.org/drawingml/2006/compatibility" xmlns:p14="http://schemas.microsoft.com/office/powerpoint/2010/main" xmlns:p15="http://schemas.microsoft.com/office/powerpoint/2012/main" xmlns:ahyp="http://schemas.microsoft.com/office/drawing/2018/hyperlinkcolor" showMasterPhAnim="0" showMasterSp="0">
+  <p:cSld>
+    <p:spTree>
+      <p:nvGrpSpPr>
+        <p:cNvPr id="154" name="Shape 154"/>
+        <p:cNvGrpSpPr/>
+        <p:nvPr/>
+      </p:nvGrpSpPr>
+      <p:grpSpPr>
+        <a:xfrm>
+          <a:off x="0" y="0"/>
+          <a:ext cx="0" cy="0"/>
+          <a:chOff x="0" y="0"/>
+          <a:chExt cx="0" cy="0"/>
+        </a:xfrm>
+      </p:grpSpPr>
+      <p:sp>
+        <p:nvSpPr>
+          <p:cNvPr id="155" name="Google Shape;155;g37fcc201e2e_1_11:notes"/>
+          <p:cNvSpPr txBox="1"/>
+          <p:nvPr>
+            <p:ph idx="1" type="body"/>
+          </p:nvPr>
+        </p:nvSpPr>
+        <p:spPr>
+          <a:xfrm>
+            <a:off x="685800" y="4343400"/>
+            <a:ext cx="5486400" cy="4114800"/>
+          </a:xfrm>
+          <a:prstGeom prst="rect">
+            <a:avLst/>
+          </a:prstGeom>
+          <a:noFill/>
+          <a:ln>
+            <a:noFill/>
+          </a:ln>
+        </p:spPr>
+        <p:txBody>
+          <a:bodyPr anchorCtr="0" anchor="ctr" bIns="91425" lIns="91425" spcFirstLastPara="1" rIns="91425" wrap="square" tIns="91425">
+            <a:noAutofit/>
+          </a:bodyPr>
+          <a:lstStyle/>
+          <a:p>
+            <a:pPr indent="0" lvl="0" marL="0" rtl="0" algn="l">
+              <a:lnSpc>
+                <a:spcPct val="100000"/>
+              </a:lnSpc>
+              <a:spcBef>
+                <a:spcPts val="0"/>
+              </a:spcBef>
+              <a:spcAft>
+                <a:spcPts val="0"/>
+              </a:spcAft>
+              <a:buClr>
+                <a:schemeClr val="dk1"/>
+              </a:buClr>
+              <a:buSzPts val="1100"/>
+              <a:buFont typeface="Lato Light"/>
+              <a:buNone/>
+            </a:pPr>
+            <a:r>
+              <a:t/>
+            </a:r>
+            <a:endParaRPr/>
+          </a:p>
+        </p:txBody>
+      </p:sp>
+      <p:sp>
+        <p:nvSpPr>
+          <p:cNvPr id="156" name="Google Shape;156;g37fcc201e2e_1_11:notes"/>
           <p:cNvSpPr/>
           <p:nvPr>
             <p:ph idx="2" type="sldImg"/>
@@ -7071,7 +7315,7 @@
       </p:grpSpPr>
       <p:sp>
         <p:nvSpPr>
-          <p:cNvPr id="134" name="Google Shape;134;g37e4d9bba6d_0_39"/>
+          <p:cNvPr id="134" name="Google Shape;134;g37fcc201e2e_1_0"/>
           <p:cNvSpPr txBox="1"/>
           <p:nvPr/>
         </p:nvSpPr>
@@ -7137,7 +7381,7 @@
       </p:sp>
       <p:sp>
         <p:nvSpPr>
-          <p:cNvPr id="135" name="Google Shape;135;g37e4d9bba6d_0_39"/>
+          <p:cNvPr id="135" name="Google Shape;135;g37fcc201e2e_1_0"/>
           <p:cNvSpPr/>
           <p:nvPr/>
         </p:nvSpPr>
@@ -7207,7 +7451,7 @@
       </p:sp>
       <p:sp>
         <p:nvSpPr>
-          <p:cNvPr id="136" name="Google Shape;136;g37e4d9bba6d_0_39"/>
+          <p:cNvPr id="136" name="Google Shape;136;g37fcc201e2e_1_0"/>
           <p:cNvSpPr txBox="1"/>
           <p:nvPr/>
         </p:nvSpPr>
@@ -7268,7 +7512,7 @@
                 <a:cs typeface="Calibri"/>
                 <a:sym typeface="Calibri"/>
               </a:rPr>
-              <a:t>EX 3: Using the Perfetto Profiler</a:t>
+              <a:t>EX 2: Callbacks &amp; Device objects</a:t>
             </a:r>
             <a:endParaRPr b="1" i="0" sz="3000" u="none" cap="none" strike="noStrike">
               <a:solidFill>
@@ -7284,7 +7528,7 @@
       </p:sp>
       <p:sp>
         <p:nvSpPr>
-          <p:cNvPr id="137" name="Google Shape;137;g37e4d9bba6d_0_39"/>
+          <p:cNvPr id="137" name="Google Shape;137;g37fcc201e2e_1_0"/>
           <p:cNvSpPr txBox="1"/>
           <p:nvPr/>
         </p:nvSpPr>
@@ -7326,16 +7570,36 @@
                 <a:cs typeface="Calibri"/>
                 <a:sym typeface="Calibri"/>
               </a:rPr>
-              <a:t>Step 1</a:t>
-            </a:r>
-            <a:r>
-              <a:rPr lang="en-GB" sz="2000">
-                <a:latin typeface="Calibri"/>
-                <a:ea typeface="Calibri"/>
-                <a:cs typeface="Calibri"/>
-                <a:sym typeface="Calibri"/>
-              </a:rPr>
-              <a:t> - Select a different data source, edit </a:t>
+              <a:t>What is a callback?</a:t>
+            </a:r>
+            <a:endParaRPr b="1" sz="2000">
+              <a:latin typeface="Calibri"/>
+              <a:ea typeface="Calibri"/>
+              <a:cs typeface="Calibri"/>
+              <a:sym typeface="Calibri"/>
+            </a:endParaRPr>
+          </a:p>
+          <a:p>
+            <a:pPr indent="0" lvl="0" marL="0" marR="0" rtl="0" algn="l">
+              <a:lnSpc>
+                <a:spcPct val="100000"/>
+              </a:lnSpc>
+              <a:spcBef>
+                <a:spcPts val="0"/>
+              </a:spcBef>
+              <a:spcAft>
+                <a:spcPts val="0"/>
+              </a:spcAft>
+              <a:buNone/>
+            </a:pPr>
+            <a:r>
+              <a:rPr lang="en-GB" sz="1700">
+                <a:latin typeface="Calibri"/>
+                <a:ea typeface="Calibri"/>
+                <a:cs typeface="Calibri"/>
+                <a:sym typeface="Calibri"/>
+              </a:rPr>
+              <a:t>A callback is programming pattern in which a function is passed from one context (your code) to another (android-runner) such that the provider can call the function when certain events occur. For instance, the experiment progresses and your </a:t>
             </a:r>
             <a:r>
               <a:rPr lang="en-GB" sz="1700">
@@ -7344,27 +7608,40 @@
                 <a:cs typeface="Courier New"/>
                 <a:sym typeface="Courier New"/>
               </a:rPr>
-              <a:t>perfetto_config.pbtx</a:t>
-            </a:r>
-            <a:r>
-              <a:rPr lang="en-GB" sz="2200">
-                <a:latin typeface="Calibri"/>
-                <a:ea typeface="Calibri"/>
-                <a:cs typeface="Calibri"/>
-                <a:sym typeface="Calibri"/>
-              </a:rPr>
-              <a:t> </a:t>
-            </a:r>
-            <a:r>
-              <a:rPr lang="en-GB" sz="2000">
-                <a:latin typeface="Calibri"/>
-                <a:ea typeface="Calibri"/>
-                <a:cs typeface="Calibri"/>
-                <a:sym typeface="Calibri"/>
-              </a:rPr>
-              <a:t>to configure the new data source</a:t>
-            </a:r>
-            <a:endParaRPr sz="2000">
+              <a:t>interaction</a:t>
+            </a:r>
+            <a:r>
+              <a:rPr lang="en-GB" sz="1700">
+                <a:latin typeface="Calibri"/>
+                <a:ea typeface="Calibri"/>
+                <a:cs typeface="Calibri"/>
+                <a:sym typeface="Calibri"/>
+              </a:rPr>
+              <a:t> script is called. For a full list of available callbacks, see the </a:t>
+            </a:r>
+            <a:r>
+              <a:rPr lang="en-GB" sz="1700" u="sng">
+                <a:solidFill>
+                  <a:schemeClr val="hlink"/>
+                </a:solidFill>
+                <a:latin typeface="Calibri"/>
+                <a:ea typeface="Calibri"/>
+                <a:cs typeface="Calibri"/>
+                <a:sym typeface="Calibri"/>
+                <a:hlinkClick r:id="rId3"/>
+              </a:rPr>
+              <a:t>lab guide</a:t>
+            </a:r>
+            <a:r>
+              <a:rPr lang="en-GB" sz="1700">
+                <a:latin typeface="Calibri"/>
+                <a:ea typeface="Calibri"/>
+                <a:cs typeface="Calibri"/>
+                <a:sym typeface="Calibri"/>
+              </a:rPr>
+              <a:t>.</a:t>
+            </a:r>
+            <a:endParaRPr b="1" sz="2000">
               <a:latin typeface="Calibri"/>
               <a:ea typeface="Calibri"/>
               <a:cs typeface="Calibri"/>
@@ -7372,28 +7649,81 @@
             </a:endParaRPr>
           </a:p>
           <a:p>
-            <a:pPr indent="-336550" lvl="0" marL="457200" marR="0" rtl="0" algn="l">
-              <a:lnSpc>
-                <a:spcPct val="100000"/>
-              </a:lnSpc>
-              <a:spcBef>
-                <a:spcPts val="0"/>
-              </a:spcBef>
-              <a:spcAft>
-                <a:spcPts val="0"/>
-              </a:spcAft>
-              <a:buSzPts val="1700"/>
-              <a:buFont typeface="Calibri"/>
-              <a:buChar char="-"/>
+            <a:pPr indent="0" lvl="0" marL="0" rtl="0" algn="l">
+              <a:spcBef>
+                <a:spcPts val="0"/>
+              </a:spcBef>
+              <a:spcAft>
+                <a:spcPts val="0"/>
+              </a:spcAft>
+              <a:buNone/>
+            </a:pPr>
+            <a:r>
+              <a:t/>
+            </a:r>
+            <a:endParaRPr b="1" sz="2000">
+              <a:solidFill>
+                <a:schemeClr val="dk1"/>
+              </a:solidFill>
+              <a:latin typeface="Calibri"/>
+              <a:ea typeface="Calibri"/>
+              <a:cs typeface="Calibri"/>
+              <a:sym typeface="Calibri"/>
+            </a:endParaRPr>
+          </a:p>
+          <a:p>
+            <a:pPr indent="0" lvl="0" marL="0" rtl="0" algn="l">
+              <a:spcBef>
+                <a:spcPts val="0"/>
+              </a:spcBef>
+              <a:spcAft>
+                <a:spcPts val="0"/>
+              </a:spcAft>
+              <a:buNone/>
+            </a:pPr>
+            <a:r>
+              <a:rPr b="1" lang="en-GB" sz="2000">
+                <a:solidFill>
+                  <a:schemeClr val="dk1"/>
+                </a:solidFill>
+                <a:latin typeface="Calibri"/>
+                <a:ea typeface="Calibri"/>
+                <a:cs typeface="Calibri"/>
+                <a:sym typeface="Calibri"/>
+              </a:rPr>
+              <a:t>Moving files via Device objects:</a:t>
+            </a:r>
+            <a:endParaRPr b="1" sz="2000">
+              <a:solidFill>
+                <a:schemeClr val="dk1"/>
+              </a:solidFill>
+              <a:latin typeface="Calibri"/>
+              <a:ea typeface="Calibri"/>
+              <a:cs typeface="Calibri"/>
+              <a:sym typeface="Calibri"/>
+            </a:endParaRPr>
+          </a:p>
+          <a:p>
+            <a:pPr indent="0" lvl="0" marL="0" marR="0" rtl="0" algn="l">
+              <a:lnSpc>
+                <a:spcPct val="100000"/>
+              </a:lnSpc>
+              <a:spcBef>
+                <a:spcPts val="0"/>
+              </a:spcBef>
+              <a:spcAft>
+                <a:spcPts val="0"/>
+              </a:spcAft>
+              <a:buNone/>
             </a:pPr>
             <a:r>
               <a:rPr lang="en-GB" sz="1700">
-                <a:latin typeface="Calibri"/>
-                <a:ea typeface="Calibri"/>
-                <a:cs typeface="Calibri"/>
-                <a:sym typeface="Calibri"/>
-              </a:rPr>
-              <a:t>Lots of sources available: e.g. atrace, ftrace, heap profiler</a:t>
+                <a:latin typeface="Courier New"/>
+                <a:ea typeface="Courier New"/>
+                <a:cs typeface="Courier New"/>
+                <a:sym typeface="Courier New"/>
+              </a:rPr>
+              <a:t>device.push(&lt;path/to/myfile.txt&gt;)</a:t>
             </a:r>
             <a:endParaRPr sz="1700">
               <a:latin typeface="Calibri"/>
@@ -7403,28 +7733,20 @@
             </a:endParaRPr>
           </a:p>
           <a:p>
-            <a:pPr indent="-336550" lvl="0" marL="457200" marR="0" rtl="0" algn="l">
-              <a:lnSpc>
-                <a:spcPct val="100000"/>
-              </a:lnSpc>
-              <a:spcBef>
-                <a:spcPts val="0"/>
-              </a:spcBef>
-              <a:spcAft>
-                <a:spcPts val="0"/>
-              </a:spcAft>
-              <a:buSzPts val="1700"/>
-              <a:buFont typeface="Calibri"/>
-              <a:buChar char="-"/>
-            </a:pPr>
-            <a:r>
-              <a:rPr lang="en-GB" sz="1700">
-                <a:latin typeface="Calibri"/>
-                <a:ea typeface="Calibri"/>
-                <a:cs typeface="Calibri"/>
-                <a:sym typeface="Calibri"/>
-              </a:rPr>
-              <a:t>You can also select different metrics from the current sources</a:t>
+            <a:pPr indent="0" lvl="0" marL="0" marR="0" rtl="0" algn="l">
+              <a:lnSpc>
+                <a:spcPct val="100000"/>
+              </a:lnSpc>
+              <a:spcBef>
+                <a:spcPts val="0"/>
+              </a:spcBef>
+              <a:spcAft>
+                <a:spcPts val="0"/>
+              </a:spcAft>
+              <a:buNone/>
+            </a:pPr>
+            <a:r>
+              <a:t/>
             </a:r>
             <a:endParaRPr sz="1700">
               <a:latin typeface="Calibri"/>
@@ -7434,63 +7756,431 @@
             </a:endParaRPr>
           </a:p>
           <a:p>
-            <a:pPr indent="-336550" lvl="0" marL="457200" marR="0" rtl="0" algn="l">
-              <a:lnSpc>
-                <a:spcPct val="100000"/>
-              </a:lnSpc>
-              <a:spcBef>
-                <a:spcPts val="0"/>
-              </a:spcBef>
-              <a:spcAft>
-                <a:spcPts val="0"/>
-              </a:spcAft>
-              <a:buSzPts val="1700"/>
-              <a:buFont typeface="Calibri"/>
-              <a:buChar char="-"/>
+            <a:pPr indent="0" lvl="0" marL="0" marR="0" rtl="0" algn="l">
+              <a:lnSpc>
+                <a:spcPct val="100000"/>
+              </a:lnSpc>
+              <a:spcBef>
+                <a:spcPts val="0"/>
+              </a:spcBef>
+              <a:spcAft>
+                <a:spcPts val="0"/>
+              </a:spcAft>
+              <a:buNone/>
             </a:pPr>
             <a:r>
               <a:rPr lang="en-GB" sz="1700">
-                <a:latin typeface="Calibri"/>
-                <a:ea typeface="Calibri"/>
-                <a:cs typeface="Calibri"/>
-                <a:sym typeface="Calibri"/>
-              </a:rPr>
-              <a:t>Refer to the perfetto </a:t>
-            </a:r>
-            <a:r>
-              <a:rPr lang="en-GB" sz="1700" u="sng">
-                <a:solidFill>
-                  <a:schemeClr val="hlink"/>
-                </a:solidFill>
-                <a:latin typeface="Calibri"/>
-                <a:ea typeface="Calibri"/>
-                <a:cs typeface="Calibri"/>
-                <a:sym typeface="Calibri"/>
-                <a:hlinkClick r:id="rId3"/>
-              </a:rPr>
-              <a:t>config </a:t>
-            </a:r>
-            <a:r>
-              <a:rPr lang="en-GB" sz="1700" u="sng">
-                <a:solidFill>
-                  <a:schemeClr val="hlink"/>
-                </a:solidFill>
-                <a:latin typeface="Calibri"/>
-                <a:ea typeface="Calibri"/>
-                <a:cs typeface="Calibri"/>
-                <a:sym typeface="Calibri"/>
-                <a:hlinkClick r:id="rId4"/>
-              </a:rPr>
-              <a:t>specification</a:t>
-            </a:r>
+                <a:latin typeface="Courier New"/>
+                <a:ea typeface="Courier New"/>
+                <a:cs typeface="Courier New"/>
+                <a:sym typeface="Courier New"/>
+              </a:rPr>
+              <a:t>device.pull(&lt;path/to/myfile.txt&gt;)</a:t>
+            </a:r>
+            <a:endParaRPr b="1" sz="2000">
+              <a:solidFill>
+                <a:schemeClr val="dk1"/>
+              </a:solidFill>
+              <a:latin typeface="Calibri"/>
+              <a:ea typeface="Calibri"/>
+              <a:cs typeface="Calibri"/>
+              <a:sym typeface="Calibri"/>
+            </a:endParaRPr>
+          </a:p>
+          <a:p>
+            <a:pPr indent="0" lvl="0" marL="0" rtl="0" algn="l">
+              <a:spcBef>
+                <a:spcPts val="0"/>
+              </a:spcBef>
+              <a:spcAft>
+                <a:spcPts val="0"/>
+              </a:spcAft>
+              <a:buClr>
+                <a:schemeClr val="dk1"/>
+              </a:buClr>
+              <a:buSzPts val="1100"/>
+              <a:buFont typeface="Arial"/>
+              <a:buNone/>
+            </a:pPr>
+            <a:r>
+              <a:t/>
+            </a:r>
+            <a:endParaRPr b="1" sz="2000">
+              <a:solidFill>
+                <a:schemeClr val="dk1"/>
+              </a:solidFill>
+              <a:latin typeface="Calibri"/>
+              <a:ea typeface="Calibri"/>
+              <a:cs typeface="Calibri"/>
+              <a:sym typeface="Calibri"/>
+            </a:endParaRPr>
+          </a:p>
+          <a:p>
+            <a:pPr indent="0" lvl="0" marL="0" marR="0" rtl="0" algn="l">
+              <a:lnSpc>
+                <a:spcPct val="100000"/>
+              </a:lnSpc>
+              <a:spcBef>
+                <a:spcPts val="0"/>
+              </a:spcBef>
+              <a:spcAft>
+                <a:spcPts val="0"/>
+              </a:spcAft>
+              <a:buNone/>
+            </a:pPr>
+            <a:r>
+              <a:rPr b="1" lang="en-GB" sz="2000">
+                <a:latin typeface="Calibri"/>
+                <a:ea typeface="Calibri"/>
+                <a:cs typeface="Calibri"/>
+                <a:sym typeface="Calibri"/>
+              </a:rPr>
+              <a:t>Launching apps via Device objects</a:t>
+            </a:r>
+            <a:r>
+              <a:rPr b="1" lang="en-GB" sz="2000">
+                <a:latin typeface="Calibri"/>
+                <a:ea typeface="Calibri"/>
+                <a:cs typeface="Calibri"/>
+                <a:sym typeface="Calibri"/>
+              </a:rPr>
+              <a:t>:</a:t>
+            </a:r>
+            <a:endParaRPr b="1" sz="2000">
+              <a:latin typeface="Calibri"/>
+              <a:ea typeface="Calibri"/>
+              <a:cs typeface="Calibri"/>
+              <a:sym typeface="Calibri"/>
+            </a:endParaRPr>
+          </a:p>
+          <a:p>
+            <a:pPr indent="0" lvl="0" marL="0" marR="0" rtl="0" algn="l">
+              <a:lnSpc>
+                <a:spcPct val="100000"/>
+              </a:lnSpc>
+              <a:spcBef>
+                <a:spcPts val="0"/>
+              </a:spcBef>
+              <a:spcAft>
+                <a:spcPts val="0"/>
+              </a:spcAft>
+              <a:buNone/>
+            </a:pPr>
             <a:r>
               <a:rPr lang="en-GB" sz="1700">
-                <a:latin typeface="Calibri"/>
-                <a:ea typeface="Calibri"/>
-                <a:cs typeface="Calibri"/>
-                <a:sym typeface="Calibri"/>
-              </a:rPr>
-              <a:t> to see what metrics are available</a:t>
+                <a:solidFill>
+                  <a:srgbClr val="333333"/>
+                </a:solidFill>
+                <a:latin typeface="Calibri"/>
+                <a:ea typeface="Calibri"/>
+                <a:cs typeface="Calibri"/>
+                <a:sym typeface="Calibri"/>
+              </a:rPr>
+              <a:t>device.launch_activity(</a:t>
+            </a:r>
+            <a:r>
+              <a:rPr lang="en-GB" sz="1700">
+                <a:solidFill>
+                  <a:srgbClr val="DD1144"/>
+                </a:solidFill>
+                <a:latin typeface="Calibri"/>
+                <a:ea typeface="Calibri"/>
+                <a:cs typeface="Calibri"/>
+                <a:sym typeface="Calibri"/>
+              </a:rPr>
+              <a:t>"org.videolan.vlc"</a:t>
+            </a:r>
+            <a:r>
+              <a:rPr lang="en-GB" sz="1700">
+                <a:solidFill>
+                  <a:srgbClr val="333333"/>
+                </a:solidFill>
+                <a:latin typeface="Calibri"/>
+                <a:ea typeface="Calibri"/>
+                <a:cs typeface="Calibri"/>
+                <a:sym typeface="Calibri"/>
+              </a:rPr>
+              <a:t>, </a:t>
+            </a:r>
+            <a:endParaRPr sz="1700">
+              <a:solidFill>
+                <a:srgbClr val="333333"/>
+              </a:solidFill>
+              <a:latin typeface="Calibri"/>
+              <a:ea typeface="Calibri"/>
+              <a:cs typeface="Calibri"/>
+              <a:sym typeface="Calibri"/>
+            </a:endParaRPr>
+          </a:p>
+          <a:p>
+            <a:pPr indent="0" lvl="0" marL="0" marR="0" rtl="0" algn="l">
+              <a:lnSpc>
+                <a:spcPct val="100000"/>
+              </a:lnSpc>
+              <a:spcBef>
+                <a:spcPts val="0"/>
+              </a:spcBef>
+              <a:spcAft>
+                <a:spcPts val="0"/>
+              </a:spcAft>
+              <a:buNone/>
+            </a:pPr>
+            <a:r>
+              <a:rPr lang="en-GB" sz="1700">
+                <a:solidFill>
+                  <a:srgbClr val="333333"/>
+                </a:solidFill>
+                <a:latin typeface="Calibri"/>
+                <a:ea typeface="Calibri"/>
+                <a:cs typeface="Calibri"/>
+                <a:sym typeface="Calibri"/>
+              </a:rPr>
+              <a:t>                       </a:t>
+            </a:r>
+            <a:r>
+              <a:rPr lang="en-GB" sz="1700">
+                <a:solidFill>
+                  <a:srgbClr val="000080"/>
+                </a:solidFill>
+                <a:latin typeface="Calibri"/>
+                <a:ea typeface="Calibri"/>
+                <a:cs typeface="Calibri"/>
+                <a:sym typeface="Calibri"/>
+              </a:rPr>
+              <a:t>activity</a:t>
+            </a:r>
+            <a:r>
+              <a:rPr lang="en-GB" sz="1700">
+                <a:solidFill>
+                  <a:srgbClr val="333333"/>
+                </a:solidFill>
+                <a:latin typeface="Calibri"/>
+                <a:ea typeface="Calibri"/>
+                <a:cs typeface="Calibri"/>
+                <a:sym typeface="Calibri"/>
+              </a:rPr>
+              <a:t>=</a:t>
+            </a:r>
+            <a:r>
+              <a:rPr lang="en-GB" sz="1700">
+                <a:solidFill>
+                  <a:srgbClr val="DD1144"/>
+                </a:solidFill>
+                <a:latin typeface="Calibri"/>
+                <a:ea typeface="Calibri"/>
+                <a:cs typeface="Calibri"/>
+                <a:sym typeface="Calibri"/>
+              </a:rPr>
+              <a:t>".StartActivity"</a:t>
+            </a:r>
+            <a:r>
+              <a:rPr lang="en-GB" sz="1700">
+                <a:solidFill>
+                  <a:srgbClr val="333333"/>
+                </a:solidFill>
+                <a:latin typeface="Calibri"/>
+                <a:ea typeface="Calibri"/>
+                <a:cs typeface="Calibri"/>
+                <a:sym typeface="Calibri"/>
+              </a:rPr>
+              <a:t>, </a:t>
+            </a:r>
+            <a:endParaRPr sz="1700">
+              <a:solidFill>
+                <a:srgbClr val="333333"/>
+              </a:solidFill>
+              <a:latin typeface="Calibri"/>
+              <a:ea typeface="Calibri"/>
+              <a:cs typeface="Calibri"/>
+              <a:sym typeface="Calibri"/>
+            </a:endParaRPr>
+          </a:p>
+          <a:p>
+            <a:pPr indent="0" lvl="0" marL="0" marR="0" rtl="0" algn="l">
+              <a:lnSpc>
+                <a:spcPct val="100000"/>
+              </a:lnSpc>
+              <a:spcBef>
+                <a:spcPts val="0"/>
+              </a:spcBef>
+              <a:spcAft>
+                <a:spcPts val="0"/>
+              </a:spcAft>
+              <a:buNone/>
+            </a:pPr>
+            <a:r>
+              <a:rPr lang="en-GB" sz="1700">
+                <a:solidFill>
+                  <a:srgbClr val="333333"/>
+                </a:solidFill>
+                <a:latin typeface="Calibri"/>
+                <a:ea typeface="Calibri"/>
+                <a:cs typeface="Calibri"/>
+                <a:sym typeface="Calibri"/>
+              </a:rPr>
+              <a:t>                       </a:t>
+            </a:r>
+            <a:r>
+              <a:rPr lang="en-GB" sz="1700">
+                <a:solidFill>
+                  <a:srgbClr val="000080"/>
+                </a:solidFill>
+                <a:latin typeface="Calibri"/>
+                <a:ea typeface="Calibri"/>
+                <a:cs typeface="Calibri"/>
+                <a:sym typeface="Calibri"/>
+              </a:rPr>
+              <a:t>action</a:t>
+            </a:r>
+            <a:r>
+              <a:rPr lang="en-GB" sz="1700">
+                <a:solidFill>
+                  <a:srgbClr val="333333"/>
+                </a:solidFill>
+                <a:latin typeface="Calibri"/>
+                <a:ea typeface="Calibri"/>
+                <a:cs typeface="Calibri"/>
+                <a:sym typeface="Calibri"/>
+              </a:rPr>
+              <a:t>=</a:t>
+            </a:r>
+            <a:r>
+              <a:rPr lang="en-GB" sz="1700">
+                <a:solidFill>
+                  <a:srgbClr val="DD1144"/>
+                </a:solidFill>
+                <a:latin typeface="Calibri"/>
+                <a:ea typeface="Calibri"/>
+                <a:cs typeface="Calibri"/>
+                <a:sym typeface="Calibri"/>
+              </a:rPr>
+              <a:t>"android.intent.action.VIEW"</a:t>
+            </a:r>
+            <a:r>
+              <a:rPr lang="en-GB" sz="1700">
+                <a:solidFill>
+                  <a:srgbClr val="333333"/>
+                </a:solidFill>
+                <a:latin typeface="Calibri"/>
+                <a:ea typeface="Calibri"/>
+                <a:cs typeface="Calibri"/>
+                <a:sym typeface="Calibri"/>
+              </a:rPr>
+              <a:t>, </a:t>
+            </a:r>
+            <a:endParaRPr sz="1700">
+              <a:solidFill>
+                <a:srgbClr val="333333"/>
+              </a:solidFill>
+              <a:latin typeface="Calibri"/>
+              <a:ea typeface="Calibri"/>
+              <a:cs typeface="Calibri"/>
+              <a:sym typeface="Calibri"/>
+            </a:endParaRPr>
+          </a:p>
+          <a:p>
+            <a:pPr indent="0" lvl="0" marL="76200" marR="76200" rtl="0" algn="l">
+              <a:lnSpc>
+                <a:spcPct val="115000"/>
+              </a:lnSpc>
+              <a:spcBef>
+                <a:spcPts val="0"/>
+              </a:spcBef>
+              <a:spcAft>
+                <a:spcPts val="0"/>
+              </a:spcAft>
+              <a:buClr>
+                <a:schemeClr val="dk1"/>
+              </a:buClr>
+              <a:buSzPts val="1100"/>
+              <a:buFont typeface="Arial"/>
+              <a:buNone/>
+            </a:pPr>
+            <a:r>
+              <a:rPr lang="en-GB" sz="1700">
+                <a:solidFill>
+                  <a:srgbClr val="333333"/>
+                </a:solidFill>
+                <a:latin typeface="Calibri"/>
+                <a:ea typeface="Calibri"/>
+                <a:cs typeface="Calibri"/>
+                <a:sym typeface="Calibri"/>
+              </a:rPr>
+              <a:t>                     </a:t>
+            </a:r>
+            <a:r>
+              <a:rPr lang="en-GB" sz="1700">
+                <a:solidFill>
+                  <a:srgbClr val="000080"/>
+                </a:solidFill>
+                <a:latin typeface="Calibri"/>
+                <a:ea typeface="Calibri"/>
+                <a:cs typeface="Calibri"/>
+                <a:sym typeface="Calibri"/>
+              </a:rPr>
+              <a:t>data_uri</a:t>
+            </a:r>
+            <a:r>
+              <a:rPr lang="en-GB" sz="1700">
+                <a:solidFill>
+                  <a:srgbClr val="333333"/>
+                </a:solidFill>
+                <a:latin typeface="Calibri"/>
+                <a:ea typeface="Calibri"/>
+                <a:cs typeface="Calibri"/>
+                <a:sym typeface="Calibri"/>
+              </a:rPr>
+              <a:t>=</a:t>
+            </a:r>
+            <a:r>
+              <a:rPr lang="en-GB" sz="1700">
+                <a:solidFill>
+                  <a:srgbClr val="DD1144"/>
+                </a:solidFill>
+                <a:latin typeface="Calibri"/>
+                <a:ea typeface="Calibri"/>
+                <a:cs typeface="Calibri"/>
+                <a:sym typeface="Calibri"/>
+              </a:rPr>
+              <a:t>f"file:///sdcard/Download/videos/test_video_480.mp4"</a:t>
+            </a:r>
+            <a:r>
+              <a:rPr lang="en-GB" sz="1700">
+                <a:solidFill>
+                  <a:srgbClr val="333333"/>
+                </a:solidFill>
+                <a:latin typeface="Calibri"/>
+                <a:ea typeface="Calibri"/>
+                <a:cs typeface="Calibri"/>
+                <a:sym typeface="Calibri"/>
+              </a:rPr>
+              <a:t>)</a:t>
+            </a:r>
+            <a:endParaRPr sz="1700">
+              <a:solidFill>
+                <a:srgbClr val="333333"/>
+              </a:solidFill>
+              <a:latin typeface="Calibri"/>
+              <a:ea typeface="Calibri"/>
+              <a:cs typeface="Calibri"/>
+              <a:sym typeface="Calibri"/>
+            </a:endParaRPr>
+          </a:p>
+          <a:p>
+            <a:pPr indent="0" lvl="0" marL="0" marR="0" rtl="0" algn="l">
+              <a:lnSpc>
+                <a:spcPct val="100000"/>
+              </a:lnSpc>
+              <a:spcBef>
+                <a:spcPts val="0"/>
+              </a:spcBef>
+              <a:spcAft>
+                <a:spcPts val="0"/>
+              </a:spcAft>
+              <a:buNone/>
+            </a:pPr>
+            <a:r>
+              <a:t/>
             </a:r>
             <a:endParaRPr sz="1700">
               <a:latin typeface="Calibri"/>
@@ -7510,17 +8200,12 @@
               <a:spcAft>
                 <a:spcPts val="0"/>
               </a:spcAft>
-              <a:buClr>
-                <a:srgbClr val="000000"/>
-              </a:buClr>
-              <a:buSzPts val="2100"/>
-              <a:buFont typeface="Arial"/>
               <a:buNone/>
             </a:pPr>
             <a:r>
               <a:t/>
             </a:r>
-            <a:endParaRPr sz="1700">
+            <a:endParaRPr b="1" sz="2000">
               <a:latin typeface="Calibri"/>
               <a:ea typeface="Calibri"/>
               <a:cs typeface="Calibri"/>
@@ -7538,32 +8223,12 @@
               <a:spcAft>
                 <a:spcPts val="0"/>
               </a:spcAft>
-              <a:buClr>
-                <a:srgbClr val="000000"/>
-              </a:buClr>
-              <a:buSzPts val="2100"/>
-              <a:buFont typeface="Arial"/>
               <a:buNone/>
             </a:pPr>
             <a:r>
-              <a:rPr b="1" lang="en-GB" sz="2000">
-                <a:latin typeface="Calibri"/>
-                <a:ea typeface="Calibri"/>
-                <a:cs typeface="Calibri"/>
-                <a:sym typeface="Calibri"/>
-              </a:rPr>
-              <a:t>Step 2</a:t>
-            </a:r>
-            <a:r>
-              <a:rPr lang="en-GB" sz="2000">
-                <a:latin typeface="Calibri"/>
-                <a:ea typeface="Calibri"/>
-                <a:cs typeface="Calibri"/>
-                <a:sym typeface="Calibri"/>
-              </a:rPr>
-              <a:t> - Perform a test run of your experiment. This will generate some traces in binary format we can use in the next step.</a:t>
-            </a:r>
-            <a:endParaRPr sz="2000">
+              <a:t/>
+            </a:r>
+            <a:endParaRPr b="1" sz="2000">
               <a:latin typeface="Calibri"/>
               <a:ea typeface="Calibri"/>
               <a:cs typeface="Calibri"/>
@@ -7581,17 +8246,12 @@
               <a:spcAft>
                 <a:spcPts val="0"/>
               </a:spcAft>
-              <a:buClr>
-                <a:srgbClr val="000000"/>
-              </a:buClr>
-              <a:buSzPts val="2100"/>
-              <a:buFont typeface="Arial"/>
               <a:buNone/>
             </a:pPr>
             <a:r>
               <a:t/>
             </a:r>
-            <a:endParaRPr sz="1700">
+            <a:endParaRPr b="1" sz="2000">
               <a:latin typeface="Calibri"/>
               <a:ea typeface="Calibri"/>
               <a:cs typeface="Calibri"/>
@@ -7617,202 +8277,32 @@
               <a:buNone/>
             </a:pPr>
             <a:r>
-              <a:rPr b="1" lang="en-GB" sz="2000">
-                <a:latin typeface="Calibri"/>
-                <a:ea typeface="Calibri"/>
-                <a:cs typeface="Calibri"/>
-                <a:sym typeface="Calibri"/>
-              </a:rPr>
-              <a:t>Step 3</a:t>
-            </a:r>
-            <a:r>
-              <a:rPr lang="en-GB" sz="2000">
-                <a:latin typeface="Calibri"/>
-                <a:ea typeface="Calibri"/>
-                <a:cs typeface="Calibri"/>
-                <a:sym typeface="Calibri"/>
-              </a:rPr>
-              <a:t> - Read the generated trace files, and process the data as needed.</a:t>
-            </a:r>
-            <a:endParaRPr sz="2000">
-              <a:latin typeface="Calibri"/>
-              <a:ea typeface="Calibri"/>
-              <a:cs typeface="Calibri"/>
-              <a:sym typeface="Calibri"/>
-            </a:endParaRPr>
-          </a:p>
-          <a:p>
-            <a:pPr indent="-336550" lvl="0" marL="457200" marR="0" rtl="0" algn="l">
-              <a:lnSpc>
-                <a:spcPct val="100000"/>
-              </a:lnSpc>
-              <a:spcBef>
-                <a:spcPts val="0"/>
-              </a:spcBef>
-              <a:spcAft>
-                <a:spcPts val="0"/>
-              </a:spcAft>
-              <a:buSzPts val="1700"/>
-              <a:buFont typeface="Calibri"/>
-              <a:buChar char="-"/>
-            </a:pPr>
-            <a:r>
-              <a:rPr lang="en-GB" sz="1700">
-                <a:latin typeface="Calibri"/>
-                <a:ea typeface="Calibri"/>
-                <a:cs typeface="Calibri"/>
-                <a:sym typeface="Calibri"/>
-              </a:rPr>
-              <a:t>View the trace using perfetto gui at </a:t>
-            </a:r>
-            <a:r>
-              <a:rPr lang="en-GB" sz="1700" u="sng">
-                <a:solidFill>
-                  <a:schemeClr val="hlink"/>
-                </a:solidFill>
-                <a:latin typeface="Calibri"/>
-                <a:ea typeface="Calibri"/>
-                <a:cs typeface="Calibri"/>
-                <a:sym typeface="Calibri"/>
-                <a:hlinkClick r:id="rId5"/>
-              </a:rPr>
-              <a:t>ui.perfetto.dev</a:t>
-            </a:r>
-            <a:endParaRPr sz="1700">
-              <a:latin typeface="Calibri"/>
-              <a:ea typeface="Calibri"/>
-              <a:cs typeface="Calibri"/>
-              <a:sym typeface="Calibri"/>
-            </a:endParaRPr>
-          </a:p>
-          <a:p>
-            <a:pPr indent="-336550" lvl="0" marL="457200" marR="0" rtl="0" algn="l">
-              <a:lnSpc>
-                <a:spcPct val="100000"/>
-              </a:lnSpc>
-              <a:spcBef>
-                <a:spcPts val="0"/>
-              </a:spcBef>
-              <a:spcAft>
-                <a:spcPts val="0"/>
-              </a:spcAft>
-              <a:buSzPts val="1700"/>
-              <a:buFont typeface="Calibri"/>
-              <a:buChar char="-"/>
-            </a:pPr>
-            <a:r>
-              <a:rPr lang="en-GB" sz="1700">
-                <a:latin typeface="Calibri"/>
-                <a:ea typeface="Calibri"/>
-                <a:cs typeface="Calibri"/>
-                <a:sym typeface="Calibri"/>
-              </a:rPr>
-              <a:t>Programmatically</a:t>
-            </a:r>
-            <a:r>
-              <a:rPr lang="en-GB" sz="1700">
-                <a:latin typeface="Calibri"/>
-                <a:ea typeface="Calibri"/>
-                <a:cs typeface="Calibri"/>
-                <a:sym typeface="Calibri"/>
-              </a:rPr>
-              <a:t> extract data using the </a:t>
-            </a:r>
-            <a:r>
-              <a:rPr lang="en-GB" sz="1700" u="sng">
-                <a:solidFill>
-                  <a:schemeClr val="hlink"/>
-                </a:solidFill>
-                <a:latin typeface="Calibri"/>
-                <a:ea typeface="Calibri"/>
-                <a:cs typeface="Calibri"/>
-                <a:sym typeface="Calibri"/>
-                <a:hlinkClick r:id="rId6"/>
-              </a:rPr>
-              <a:t>TraceProcessor</a:t>
-            </a:r>
-            <a:r>
-              <a:rPr lang="en-GB" sz="1700">
-                <a:latin typeface="Calibri"/>
-                <a:ea typeface="Calibri"/>
-                <a:cs typeface="Calibri"/>
-                <a:sym typeface="Calibri"/>
-              </a:rPr>
-              <a:t> python library</a:t>
-            </a:r>
-            <a:endParaRPr sz="1700">
-              <a:latin typeface="Calibri"/>
-              <a:ea typeface="Calibri"/>
-              <a:cs typeface="Calibri"/>
-              <a:sym typeface="Calibri"/>
-            </a:endParaRPr>
-          </a:p>
-          <a:p>
-            <a:pPr indent="-336550" lvl="0" marL="457200" marR="0" rtl="0" algn="l">
-              <a:lnSpc>
-                <a:spcPct val="100000"/>
-              </a:lnSpc>
-              <a:spcBef>
-                <a:spcPts val="0"/>
-              </a:spcBef>
-              <a:spcAft>
-                <a:spcPts val="0"/>
-              </a:spcAft>
-              <a:buSzPts val="1700"/>
-              <a:buFont typeface="Calibri"/>
-              <a:buChar char="-"/>
-            </a:pPr>
-            <a:r>
-              <a:rPr lang="en-GB" sz="1700">
-                <a:latin typeface="Calibri"/>
-                <a:ea typeface="Calibri"/>
-                <a:cs typeface="Calibri"/>
-                <a:sym typeface="Calibri"/>
-              </a:rPr>
-              <a:t>Make sure </a:t>
-            </a:r>
-            <a:r>
-              <a:rPr lang="en-GB" sz="1700">
-                <a:latin typeface="Courier New"/>
-                <a:ea typeface="Courier New"/>
-                <a:cs typeface="Courier New"/>
-                <a:sym typeface="Courier New"/>
-              </a:rPr>
-              <a:t>subject_aggregation</a:t>
-            </a:r>
-            <a:r>
-              <a:rPr lang="en-GB" sz="1700">
-                <a:latin typeface="Calibri"/>
-                <a:ea typeface="Calibri"/>
-                <a:cs typeface="Calibri"/>
-                <a:sym typeface="Calibri"/>
-              </a:rPr>
-              <a:t> or </a:t>
-            </a:r>
-            <a:r>
-              <a:rPr lang="en-GB" sz="1700">
-                <a:latin typeface="Courier New"/>
-                <a:ea typeface="Courier New"/>
-                <a:cs typeface="Courier New"/>
-                <a:sym typeface="Courier New"/>
-              </a:rPr>
-              <a:t>experiment_aggregation</a:t>
-            </a:r>
-            <a:r>
-              <a:rPr lang="en-GB" sz="1700">
-                <a:latin typeface="Calibri"/>
-                <a:ea typeface="Calibri"/>
-                <a:cs typeface="Calibri"/>
-                <a:sym typeface="Calibri"/>
-              </a:rPr>
-              <a:t> is defined in the android-runner config</a:t>
-            </a:r>
-            <a:endParaRPr sz="1700">
-              <a:latin typeface="Calibri"/>
-              <a:ea typeface="Calibri"/>
-              <a:cs typeface="Calibri"/>
-              <a:sym typeface="Calibri"/>
-            </a:endParaRPr>
+              <a:t/>
+            </a:r>
+            <a:endParaRPr sz="1700"/>
+          </a:p>
+          <a:p>
+            <a:pPr indent="0" lvl="0" marL="0" marR="0" rtl="0" algn="l">
+              <a:lnSpc>
+                <a:spcPct val="100000"/>
+              </a:lnSpc>
+              <a:spcBef>
+                <a:spcPts val="0"/>
+              </a:spcBef>
+              <a:spcAft>
+                <a:spcPts val="0"/>
+              </a:spcAft>
+              <a:buClr>
+                <a:srgbClr val="000000"/>
+              </a:buClr>
+              <a:buSzPts val="2100"/>
+              <a:buFont typeface="Arial"/>
+              <a:buNone/>
+            </a:pPr>
+            <a:r>
+              <a:t/>
+            </a:r>
+            <a:endParaRPr sz="1700"/>
           </a:p>
           <a:p>
             <a:pPr indent="0" lvl="0" marL="0" marR="0" rtl="0" algn="l">
@@ -7835,7 +8325,7 @@
             <a:r>
               <a:t/>
             </a:r>
-            <a:endParaRPr i="0" sz="1800" u="none" cap="none" strike="noStrike">
+            <a:endParaRPr b="0" i="0" sz="1800" u="none" cap="none" strike="noStrike">
               <a:solidFill>
                 <a:srgbClr val="000000"/>
               </a:solidFill>
@@ -7874,7 +8364,7 @@
       </p:grpSpPr>
       <p:sp>
         <p:nvSpPr>
-          <p:cNvPr id="142" name="Google Shape;142;g37e4d9bba6d_0_46"/>
+          <p:cNvPr id="142" name="Google Shape;142;g37e4d9bba6d_0_39"/>
           <p:cNvSpPr txBox="1"/>
           <p:nvPr/>
         </p:nvSpPr>
@@ -7940,7 +8430,7 @@
       </p:sp>
       <p:sp>
         <p:nvSpPr>
-          <p:cNvPr id="143" name="Google Shape;143;g37e4d9bba6d_0_46"/>
+          <p:cNvPr id="143" name="Google Shape;143;g37e4d9bba6d_0_39"/>
           <p:cNvSpPr/>
           <p:nvPr/>
         </p:nvSpPr>
@@ -8010,7 +8500,7 @@
       </p:sp>
       <p:sp>
         <p:nvSpPr>
-          <p:cNvPr id="144" name="Google Shape;144;g37e4d9bba6d_0_46"/>
+          <p:cNvPr id="144" name="Google Shape;144;g37e4d9bba6d_0_39"/>
           <p:cNvSpPr txBox="1"/>
           <p:nvPr/>
         </p:nvSpPr>
@@ -8071,7 +8561,7 @@
                 <a:cs typeface="Calibri"/>
                 <a:sym typeface="Calibri"/>
               </a:rPr>
-              <a:t>EX 3: Using a New Profiler</a:t>
+              <a:t>EX 3: Using the Perfetto Profiler</a:t>
             </a:r>
             <a:endParaRPr b="1" i="0" sz="3000" u="none" cap="none" strike="noStrike">
               <a:solidFill>
@@ -8087,7 +8577,7 @@
       </p:sp>
       <p:sp>
         <p:nvSpPr>
-          <p:cNvPr id="145" name="Google Shape;145;g37e4d9bba6d_0_46"/>
+          <p:cNvPr id="145" name="Google Shape;145;g37e4d9bba6d_0_39"/>
           <p:cNvSpPr txBox="1"/>
           <p:nvPr/>
         </p:nvSpPr>
@@ -8120,11 +8610,6 @@
               <a:spcAft>
                 <a:spcPts val="0"/>
               </a:spcAft>
-              <a:buClr>
-                <a:srgbClr val="000000"/>
-              </a:buClr>
-              <a:buSzPts val="1800"/>
-              <a:buFont typeface="Arial"/>
               <a:buNone/>
             </a:pPr>
             <a:r>
@@ -8134,7 +8619,7 @@
                 <a:cs typeface="Calibri"/>
                 <a:sym typeface="Calibri"/>
               </a:rPr>
-              <a:t>Other profilers available:</a:t>
+              <a:t>Step 1</a:t>
             </a:r>
             <a:r>
               <a:rPr lang="en-GB" sz="2000">
@@ -8143,7 +8628,7 @@
                 <a:cs typeface="Calibri"/>
                 <a:sym typeface="Calibri"/>
               </a:rPr>
-              <a:t> </a:t>
+              <a:t> - Select a different data source, edit </a:t>
             </a:r>
             <a:r>
               <a:rPr lang="en-GB" sz="1700">
@@ -8152,7 +8637,7 @@
                 <a:cs typeface="Courier New"/>
                 <a:sym typeface="Courier New"/>
               </a:rPr>
-              <a:t>android</a:t>
+              <a:t>perfetto_config.pbtx</a:t>
             </a:r>
             <a:r>
               <a:rPr lang="en-GB" sz="2200">
@@ -8164,13 +8649,44 @@
               <a:t> </a:t>
             </a:r>
             <a:r>
+              <a:rPr lang="en-GB" sz="2000">
+                <a:latin typeface="Calibri"/>
+                <a:ea typeface="Calibri"/>
+                <a:cs typeface="Calibri"/>
+                <a:sym typeface="Calibri"/>
+              </a:rPr>
+              <a:t>to configure the new data source</a:t>
+            </a:r>
+            <a:endParaRPr sz="2000">
+              <a:latin typeface="Calibri"/>
+              <a:ea typeface="Calibri"/>
+              <a:cs typeface="Calibri"/>
+              <a:sym typeface="Calibri"/>
+            </a:endParaRPr>
+          </a:p>
+          <a:p>
+            <a:pPr indent="-336550" lvl="0" marL="457200" marR="0" rtl="0" algn="l">
+              <a:lnSpc>
+                <a:spcPct val="100000"/>
+              </a:lnSpc>
+              <a:spcBef>
+                <a:spcPts val="0"/>
+              </a:spcBef>
+              <a:spcAft>
+                <a:spcPts val="0"/>
+              </a:spcAft>
+              <a:buSzPts val="1700"/>
+              <a:buFont typeface="Calibri"/>
+              <a:buChar char="-"/>
+            </a:pPr>
+            <a:r>
               <a:rPr lang="en-GB" sz="1700">
-                <a:latin typeface="Courier New"/>
-                <a:ea typeface="Courier New"/>
-                <a:cs typeface="Courier New"/>
-                <a:sym typeface="Courier New"/>
-              </a:rPr>
-              <a:t>system tools, BatteryManager, Frametimes, Garbage Collection, Perfume JS (JS Engine Profiling)</a:t>
+                <a:latin typeface="Calibri"/>
+                <a:ea typeface="Calibri"/>
+                <a:cs typeface="Calibri"/>
+                <a:sym typeface="Calibri"/>
+              </a:rPr>
+              <a:t>Lots of sources available: e.g. atrace, ftrace, heap profiler</a:t>
             </a:r>
             <a:endParaRPr sz="1700">
               <a:latin typeface="Calibri"/>
@@ -8180,6 +8696,103 @@
             </a:endParaRPr>
           </a:p>
           <a:p>
+            <a:pPr indent="-336550" lvl="0" marL="457200" marR="0" rtl="0" algn="l">
+              <a:lnSpc>
+                <a:spcPct val="100000"/>
+              </a:lnSpc>
+              <a:spcBef>
+                <a:spcPts val="0"/>
+              </a:spcBef>
+              <a:spcAft>
+                <a:spcPts val="0"/>
+              </a:spcAft>
+              <a:buSzPts val="1700"/>
+              <a:buFont typeface="Calibri"/>
+              <a:buChar char="-"/>
+            </a:pPr>
+            <a:r>
+              <a:rPr lang="en-GB" sz="1700">
+                <a:latin typeface="Calibri"/>
+                <a:ea typeface="Calibri"/>
+                <a:cs typeface="Calibri"/>
+                <a:sym typeface="Calibri"/>
+              </a:rPr>
+              <a:t>You can also select different metrics from the current sources</a:t>
+            </a:r>
+            <a:endParaRPr sz="1700">
+              <a:latin typeface="Calibri"/>
+              <a:ea typeface="Calibri"/>
+              <a:cs typeface="Calibri"/>
+              <a:sym typeface="Calibri"/>
+            </a:endParaRPr>
+          </a:p>
+          <a:p>
+            <a:pPr indent="-336550" lvl="0" marL="457200" marR="0" rtl="0" algn="l">
+              <a:lnSpc>
+                <a:spcPct val="100000"/>
+              </a:lnSpc>
+              <a:spcBef>
+                <a:spcPts val="0"/>
+              </a:spcBef>
+              <a:spcAft>
+                <a:spcPts val="0"/>
+              </a:spcAft>
+              <a:buSzPts val="1700"/>
+              <a:buFont typeface="Calibri"/>
+              <a:buChar char="-"/>
+            </a:pPr>
+            <a:r>
+              <a:rPr lang="en-GB" sz="1700">
+                <a:latin typeface="Calibri"/>
+                <a:ea typeface="Calibri"/>
+                <a:cs typeface="Calibri"/>
+                <a:sym typeface="Calibri"/>
+              </a:rPr>
+              <a:t>Refer to the perfetto </a:t>
+            </a:r>
+            <a:r>
+              <a:rPr lang="en-GB" sz="1700" u="sng">
+                <a:solidFill>
+                  <a:schemeClr val="hlink"/>
+                </a:solidFill>
+                <a:latin typeface="Calibri"/>
+                <a:ea typeface="Calibri"/>
+                <a:cs typeface="Calibri"/>
+                <a:sym typeface="Calibri"/>
+                <a:hlinkClick r:id="rId3"/>
+              </a:rPr>
+              <a:t>config </a:t>
+            </a:r>
+            <a:r>
+              <a:rPr lang="en-GB" sz="1700" u="sng">
+                <a:solidFill>
+                  <a:schemeClr val="hlink"/>
+                </a:solidFill>
+                <a:latin typeface="Calibri"/>
+                <a:ea typeface="Calibri"/>
+                <a:cs typeface="Calibri"/>
+                <a:sym typeface="Calibri"/>
+                <a:hlinkClick r:id="rId4"/>
+              </a:rPr>
+              <a:t>specification</a:t>
+            </a:r>
+            <a:r>
+              <a:rPr lang="en-GB" sz="1700">
+                <a:latin typeface="Calibri"/>
+                <a:ea typeface="Calibri"/>
+                <a:cs typeface="Calibri"/>
+                <a:sym typeface="Calibri"/>
+              </a:rPr>
+              <a:t> to see what metrics are available</a:t>
+            </a:r>
+            <a:endParaRPr sz="1700">
+              <a:latin typeface="Calibri"/>
+              <a:ea typeface="Calibri"/>
+              <a:cs typeface="Calibri"/>
+              <a:sym typeface="Calibri"/>
+            </a:endParaRPr>
+          </a:p>
+          <a:p>
             <a:pPr indent="0" lvl="0" marL="0" marR="0" rtl="0" algn="l">
               <a:lnSpc>
                 <a:spcPct val="100000"/>
@@ -8190,16 +8803,49 @@
               <a:spcAft>
                 <a:spcPts val="0"/>
               </a:spcAft>
+              <a:buClr>
+                <a:srgbClr val="000000"/>
+              </a:buClr>
+              <a:buSzPts val="2100"/>
+              <a:buFont typeface="Arial"/>
               <a:buNone/>
             </a:pPr>
             <a:r>
+              <a:t/>
+            </a:r>
+            <a:endParaRPr sz="1700">
+              <a:latin typeface="Calibri"/>
+              <a:ea typeface="Calibri"/>
+              <a:cs typeface="Calibri"/>
+              <a:sym typeface="Calibri"/>
+            </a:endParaRPr>
+          </a:p>
+          <a:p>
+            <a:pPr indent="0" lvl="0" marL="0" marR="0" rtl="0" algn="l">
+              <a:lnSpc>
+                <a:spcPct val="100000"/>
+              </a:lnSpc>
+              <a:spcBef>
+                <a:spcPts val="0"/>
+              </a:spcBef>
+              <a:spcAft>
+                <a:spcPts val="0"/>
+              </a:spcAft>
+              <a:buClr>
+                <a:srgbClr val="000000"/>
+              </a:buClr>
+              <a:buSzPts val="2100"/>
+              <a:buFont typeface="Arial"/>
+              <a:buNone/>
+            </a:pPr>
+            <a:r>
               <a:rPr b="1" lang="en-GB" sz="2000">
                 <a:latin typeface="Calibri"/>
                 <a:ea typeface="Calibri"/>
                 <a:cs typeface="Calibri"/>
                 <a:sym typeface="Calibri"/>
               </a:rPr>
-              <a:t>Step 1</a:t>
+              <a:t>Step 2</a:t>
             </a:r>
             <a:r>
               <a:rPr lang="en-GB" sz="2000">
@@ -8208,7 +8854,7 @@
                 <a:cs typeface="Calibri"/>
                 <a:sym typeface="Calibri"/>
               </a:rPr>
-              <a:t> - Add your newly selected profiler to android runner with the appropriate entry in the config file.</a:t>
+              <a:t> - Perform a test run of your experiment. This will generate some traces in binary format we can use in the next step. e.g.</a:t>
             </a:r>
             <a:endParaRPr sz="2000">
               <a:latin typeface="Calibri"/>
@@ -8218,63 +8864,68 @@
             </a:endParaRPr>
           </a:p>
           <a:p>
-            <a:pPr indent="-336550" lvl="0" marL="457200" marR="0" rtl="0" algn="l">
-              <a:lnSpc>
-                <a:spcPct val="100000"/>
-              </a:lnSpc>
-              <a:spcBef>
-                <a:spcPts val="0"/>
-              </a:spcBef>
-              <a:spcAft>
-                <a:spcPts val="0"/>
-              </a:spcAft>
-              <a:buSzPts val="1700"/>
-              <a:buFont typeface="Calibri"/>
-              <a:buChar char="-"/>
+            <a:pPr indent="0" lvl="0" marL="0" marR="0" rtl="0" algn="l">
+              <a:lnSpc>
+                <a:spcPct val="100000"/>
+              </a:lnSpc>
+              <a:spcBef>
+                <a:spcPts val="0"/>
+              </a:spcBef>
+              <a:spcAft>
+                <a:spcPts val="0"/>
+              </a:spcAft>
+              <a:buClr>
+                <a:srgbClr val="000000"/>
+              </a:buClr>
+              <a:buSzPts val="2100"/>
+              <a:buFont typeface="Arial"/>
+              <a:buNone/>
             </a:pPr>
             <a:r>
               <a:rPr lang="en-GB" sz="1700">
-                <a:latin typeface="Calibri"/>
-                <a:ea typeface="Calibri"/>
-                <a:cs typeface="Calibri"/>
-                <a:sym typeface="Calibri"/>
-              </a:rPr>
-              <a:t>Some Profiler require additional dependencies like </a:t>
-            </a:r>
-            <a:r>
-              <a:rPr lang="en-GB" sz="1700" u="sng">
-                <a:solidFill>
-                  <a:schemeClr val="hlink"/>
-                </a:solidFill>
-                <a:latin typeface="Calibri"/>
-                <a:ea typeface="Calibri"/>
-                <a:cs typeface="Calibri"/>
-                <a:sym typeface="Calibri"/>
-                <a:hlinkClick r:id="rId3"/>
-              </a:rPr>
-              <a:t>BatteryManager</a:t>
+                <a:latin typeface="Courier New"/>
+                <a:ea typeface="Courier New"/>
+                <a:cs typeface="Courier New"/>
+                <a:sym typeface="Courier New"/>
+              </a:rPr>
+              <a:t>p</a:t>
             </a:r>
             <a:r>
               <a:rPr lang="en-GB" sz="1700">
-                <a:latin typeface="Calibri"/>
-                <a:ea typeface="Calibri"/>
-                <a:cs typeface="Calibri"/>
-                <a:sym typeface="Calibri"/>
-              </a:rPr>
-              <a:t> and </a:t>
-            </a:r>
-            <a:r>
-              <a:rPr lang="en-GB" sz="1700" u="sng">
-                <a:solidFill>
-                  <a:schemeClr val="hlink"/>
-                </a:solidFill>
-                <a:latin typeface="Calibri"/>
-                <a:ea typeface="Calibri"/>
-                <a:cs typeface="Calibri"/>
-                <a:sym typeface="Calibri"/>
-                <a:hlinkClick r:id="rId4"/>
-              </a:rPr>
-              <a:t>Perfume JS</a:t>
+                <a:latin typeface="Courier New"/>
+                <a:ea typeface="Courier New"/>
+                <a:cs typeface="Courier New"/>
+                <a:sym typeface="Courier New"/>
+              </a:rPr>
+              <a:t>ython . &lt;path/to/config.json&gt;</a:t>
+            </a:r>
+            <a:endParaRPr sz="2000">
+              <a:latin typeface="Calibri"/>
+              <a:ea typeface="Calibri"/>
+              <a:cs typeface="Calibri"/>
+              <a:sym typeface="Calibri"/>
+            </a:endParaRPr>
+          </a:p>
+          <a:p>
+            <a:pPr indent="0" lvl="0" marL="0" marR="0" rtl="0" algn="l">
+              <a:lnSpc>
+                <a:spcPct val="100000"/>
+              </a:lnSpc>
+              <a:spcBef>
+                <a:spcPts val="0"/>
+              </a:spcBef>
+              <a:spcAft>
+                <a:spcPts val="0"/>
+              </a:spcAft>
+              <a:buClr>
+                <a:srgbClr val="000000"/>
+              </a:buClr>
+              <a:buSzPts val="2100"/>
+              <a:buFont typeface="Arial"/>
+              <a:buNone/>
+            </a:pPr>
+            <a:r>
+              <a:t/>
             </a:r>
             <a:endParaRPr sz="1700">
               <a:latin typeface="Calibri"/>
@@ -8294,10 +8945,74 @@
               <a:spcAft>
                 <a:spcPts val="0"/>
               </a:spcAft>
+              <a:buClr>
+                <a:srgbClr val="000000"/>
+              </a:buClr>
+              <a:buSzPts val="2100"/>
+              <a:buFont typeface="Arial"/>
               <a:buNone/>
             </a:pPr>
             <a:r>
-              <a:t/>
+              <a:rPr b="1" lang="en-GB" sz="2000">
+                <a:latin typeface="Calibri"/>
+                <a:ea typeface="Calibri"/>
+                <a:cs typeface="Calibri"/>
+                <a:sym typeface="Calibri"/>
+              </a:rPr>
+              <a:t>Step 3</a:t>
+            </a:r>
+            <a:r>
+              <a:rPr lang="en-GB" sz="2000">
+                <a:latin typeface="Calibri"/>
+                <a:ea typeface="Calibri"/>
+                <a:cs typeface="Calibri"/>
+                <a:sym typeface="Calibri"/>
+              </a:rPr>
+              <a:t> - Read the generated trace files, and process the data as needed.</a:t>
+            </a:r>
+            <a:endParaRPr sz="2000">
+              <a:latin typeface="Calibri"/>
+              <a:ea typeface="Calibri"/>
+              <a:cs typeface="Calibri"/>
+              <a:sym typeface="Calibri"/>
+            </a:endParaRPr>
+          </a:p>
+          <a:p>
+            <a:pPr indent="-336550" lvl="0" marL="457200" marR="0" rtl="0" algn="l">
+              <a:lnSpc>
+                <a:spcPct val="100000"/>
+              </a:lnSpc>
+              <a:spcBef>
+                <a:spcPts val="0"/>
+              </a:spcBef>
+              <a:spcAft>
+                <a:spcPts val="0"/>
+              </a:spcAft>
+              <a:buSzPts val="1700"/>
+              <a:buFont typeface="Calibri"/>
+              <a:buChar char="-"/>
+            </a:pPr>
+            <a:r>
+              <a:rPr lang="en-GB" sz="1700">
+                <a:latin typeface="Calibri"/>
+                <a:ea typeface="Calibri"/>
+                <a:cs typeface="Calibri"/>
+                <a:sym typeface="Calibri"/>
+              </a:rPr>
+              <a:t>View the trace using perfetto gui at </a:t>
+            </a:r>
+            <a:r>
+              <a:rPr lang="en-GB" sz="1700" u="sng">
+                <a:solidFill>
+                  <a:schemeClr val="hlink"/>
+                </a:solidFill>
+                <a:latin typeface="Calibri"/>
+                <a:ea typeface="Calibri"/>
+                <a:cs typeface="Calibri"/>
+                <a:sym typeface="Calibri"/>
+                <a:hlinkClick r:id="rId5"/>
+              </a:rPr>
+              <a:t>ui.perfetto.dev</a:t>
             </a:r>
             <a:endParaRPr sz="1700">
               <a:latin typeface="Calibri"/>
@@ -8307,6 +9022,135 @@
             </a:endParaRPr>
           </a:p>
           <a:p>
+            <a:pPr indent="-336550" lvl="0" marL="457200" marR="0" rtl="0" algn="l">
+              <a:lnSpc>
+                <a:spcPct val="100000"/>
+              </a:lnSpc>
+              <a:spcBef>
+                <a:spcPts val="0"/>
+              </a:spcBef>
+              <a:spcAft>
+                <a:spcPts val="0"/>
+              </a:spcAft>
+              <a:buSzPts val="1700"/>
+              <a:buFont typeface="Calibri"/>
+              <a:buChar char="-"/>
+            </a:pPr>
+            <a:r>
+              <a:rPr lang="en-GB" sz="1700">
+                <a:latin typeface="Calibri"/>
+                <a:ea typeface="Calibri"/>
+                <a:cs typeface="Calibri"/>
+                <a:sym typeface="Calibri"/>
+              </a:rPr>
+              <a:t>Programmatically</a:t>
+            </a:r>
+            <a:r>
+              <a:rPr lang="en-GB" sz="1700">
+                <a:latin typeface="Calibri"/>
+                <a:ea typeface="Calibri"/>
+                <a:cs typeface="Calibri"/>
+                <a:sym typeface="Calibri"/>
+              </a:rPr>
+              <a:t> extract data using the </a:t>
+            </a:r>
+            <a:r>
+              <a:rPr lang="en-GB" sz="1700" u="sng">
+                <a:solidFill>
+                  <a:schemeClr val="hlink"/>
+                </a:solidFill>
+                <a:latin typeface="Calibri"/>
+                <a:ea typeface="Calibri"/>
+                <a:cs typeface="Calibri"/>
+                <a:sym typeface="Calibri"/>
+                <a:hlinkClick r:id="rId6"/>
+              </a:rPr>
+              <a:t>TraceProcessor</a:t>
+            </a:r>
+            <a:r>
+              <a:rPr lang="en-GB" sz="1700">
+                <a:latin typeface="Calibri"/>
+                <a:ea typeface="Calibri"/>
+                <a:cs typeface="Calibri"/>
+                <a:sym typeface="Calibri"/>
+              </a:rPr>
+              <a:t> python library</a:t>
+            </a:r>
+            <a:endParaRPr sz="1700">
+              <a:latin typeface="Calibri"/>
+              <a:ea typeface="Calibri"/>
+              <a:cs typeface="Calibri"/>
+              <a:sym typeface="Calibri"/>
+            </a:endParaRPr>
+          </a:p>
+          <a:p>
+            <a:pPr indent="-336550" lvl="0" marL="457200" marR="0" rtl="0" algn="l">
+              <a:lnSpc>
+                <a:spcPct val="100000"/>
+              </a:lnSpc>
+              <a:spcBef>
+                <a:spcPts val="0"/>
+              </a:spcBef>
+              <a:spcAft>
+                <a:spcPts val="0"/>
+              </a:spcAft>
+              <a:buSzPts val="1700"/>
+              <a:buFont typeface="Calibri"/>
+              <a:buChar char="-"/>
+            </a:pPr>
+            <a:r>
+              <a:rPr lang="en-GB" sz="1700">
+                <a:latin typeface="Calibri"/>
+                <a:ea typeface="Calibri"/>
+                <a:cs typeface="Calibri"/>
+                <a:sym typeface="Calibri"/>
+              </a:rPr>
+              <a:t>Make sure </a:t>
+            </a:r>
+            <a:r>
+              <a:rPr lang="en-GB" sz="1700">
+                <a:latin typeface="Courier New"/>
+                <a:ea typeface="Courier New"/>
+                <a:cs typeface="Courier New"/>
+                <a:sym typeface="Courier New"/>
+              </a:rPr>
+              <a:t>subject_aggregation</a:t>
+            </a:r>
+            <a:r>
+              <a:rPr lang="en-GB" sz="1700">
+                <a:latin typeface="Calibri"/>
+                <a:ea typeface="Calibri"/>
+                <a:cs typeface="Calibri"/>
+                <a:sym typeface="Calibri"/>
+              </a:rPr>
+              <a:t> or </a:t>
+            </a:r>
+            <a:r>
+              <a:rPr lang="en-GB" sz="1700">
+                <a:latin typeface="Courier New"/>
+                <a:ea typeface="Courier New"/>
+                <a:cs typeface="Courier New"/>
+                <a:sym typeface="Courier New"/>
+              </a:rPr>
+              <a:t>experiment_aggregation</a:t>
+            </a:r>
+            <a:r>
+              <a:rPr lang="en-GB" sz="1700">
+                <a:latin typeface="Calibri"/>
+                <a:ea typeface="Calibri"/>
+                <a:cs typeface="Calibri"/>
+                <a:sym typeface="Calibri"/>
+              </a:rPr>
+              <a:t> is defined in the android-runner config</a:t>
+            </a:r>
+            <a:endParaRPr sz="1700">
+              <a:latin typeface="Calibri"/>
+              <a:ea typeface="Calibri"/>
+              <a:cs typeface="Calibri"/>
+              <a:sym typeface="Calibri"/>
+            </a:endParaRPr>
+          </a:p>
+          <a:p>
             <a:pPr indent="0" lvl="0" marL="0" marR="0" rtl="0" algn="l">
               <a:lnSpc>
                 <a:spcPct val="100000"/>
@@ -8317,16 +9161,316 @@
               <a:spcAft>
                 <a:spcPts val="0"/>
               </a:spcAft>
+              <a:buClr>
+                <a:srgbClr val="000000"/>
+              </a:buClr>
+              <a:buSzPts val="1800"/>
+              <a:buFont typeface="Arial"/>
               <a:buNone/>
             </a:pPr>
             <a:r>
+              <a:t/>
+            </a:r>
+            <a:endParaRPr i="0" sz="1800" u="none" cap="none" strike="noStrike">
+              <a:solidFill>
+                <a:srgbClr val="000000"/>
+              </a:solidFill>
+              <a:latin typeface="Calibri"/>
+              <a:ea typeface="Calibri"/>
+              <a:cs typeface="Calibri"/>
+              <a:sym typeface="Calibri"/>
+            </a:endParaRPr>
+          </a:p>
+        </p:txBody>
+      </p:sp>
+    </p:spTree>
+  </p:cSld>
+  <p:clrMapOvr>
+    <a:masterClrMapping/>
+  </p:clrMapOvr>
+</p:sld>
+</file>
+
+<file path=ppt/slides/slide12.xml><?xml version="1.0" encoding="utf-8"?>
+<p:sld xmlns:a="http://schemas.openxmlformats.org/drawingml/2006/main" xmlns:r="http://schemas.openxmlformats.org/officeDocument/2006/relationships" xmlns:mc="http://schemas.openxmlformats.org/markup-compatibility/2006" xmlns:mv="urn:schemas-microsoft-com:mac:vml" xmlns:p="http://schemas.openxmlformats.org/presentationml/2006/main" xmlns:c="http://schemas.openxmlformats.org/drawingml/2006/chart" xmlns:dgm="http://schemas.openxmlformats.org/drawingml/2006/diagram" xmlns:o="urn:schemas-microsoft-com:office:office" xmlns:v="urn:schemas-microsoft-com:vml" xmlns:pvml="urn:schemas-microsoft-com:office:powerpoint" xmlns:com="http://schemas.openxmlformats.org/drawingml/2006/compatibility" xmlns:p14="http://schemas.microsoft.com/office/powerpoint/2010/main" xmlns:p15="http://schemas.microsoft.com/office/powerpoint/2012/main" xmlns:ahyp="http://schemas.microsoft.com/office/drawing/2018/hyperlinkcolor">
+  <p:cSld>
+    <p:spTree>
+      <p:nvGrpSpPr>
+        <p:cNvPr id="149" name="Shape 149"/>
+        <p:cNvGrpSpPr/>
+        <p:nvPr/>
+      </p:nvGrpSpPr>
+      <p:grpSpPr>
+        <a:xfrm>
+          <a:off x="0" y="0"/>
+          <a:ext cx="0" cy="0"/>
+          <a:chOff x="0" y="0"/>
+          <a:chExt cx="0" cy="0"/>
+        </a:xfrm>
+      </p:grpSpPr>
+      <p:sp>
+        <p:nvSpPr>
+          <p:cNvPr id="150" name="Google Shape;150;g37e4d9bba6d_0_46"/>
+          <p:cNvSpPr txBox="1"/>
+          <p:nvPr/>
+        </p:nvSpPr>
+        <p:spPr>
+          <a:xfrm>
+            <a:off x="2" y="6453335"/>
+            <a:ext cx="611100" cy="404400"/>
+          </a:xfrm>
+          <a:prstGeom prst="rect">
+            <a:avLst/>
+          </a:prstGeom>
+          <a:noFill/>
+          <a:ln>
+            <a:noFill/>
+          </a:ln>
+        </p:spPr>
+        <p:txBody>
+          <a:bodyPr anchorCtr="0" anchor="t" bIns="0" lIns="0" spcFirstLastPara="1" rIns="0" wrap="square" tIns="0">
+            <a:noAutofit/>
+          </a:bodyPr>
+          <a:lstStyle/>
+          <a:p>
+            <a:pPr indent="-4758" lvl="0" marL="271462" marR="0" rtl="0" algn="l">
+              <a:lnSpc>
+                <a:spcPct val="100000"/>
+              </a:lnSpc>
+              <a:spcBef>
+                <a:spcPts val="0"/>
+              </a:spcBef>
+              <a:spcAft>
+                <a:spcPts val="0"/>
+              </a:spcAft>
+              <a:buClr>
+                <a:schemeClr val="dk1"/>
+              </a:buClr>
+              <a:buSzPts val="300"/>
+              <a:buFont typeface="Lato Light"/>
+              <a:buNone/>
+            </a:pPr>
+            <a:fld id="{00000000-1234-1234-1234-123412341234}" type="slidenum">
+              <a:rPr b="0" i="0" lang="en-GB" sz="1200" u="none" cap="none" strike="noStrike">
+                <a:solidFill>
+                  <a:schemeClr val="dk1"/>
+                </a:solidFill>
+                <a:latin typeface="Lato Light"/>
+                <a:ea typeface="Lato Light"/>
+                <a:cs typeface="Lato Light"/>
+                <a:sym typeface="Lato Light"/>
+              </a:rPr>
+              <a:t>‹#›</a:t>
+            </a:fld>
+            <a:endParaRPr b="0" i="0" sz="1200" u="none" cap="none" strike="noStrike">
+              <a:solidFill>
+                <a:schemeClr val="dk1"/>
+              </a:solidFill>
+              <a:latin typeface="Lato Light"/>
+              <a:ea typeface="Lato Light"/>
+              <a:cs typeface="Lato Light"/>
+              <a:sym typeface="Lato Light"/>
+            </a:endParaRPr>
+          </a:p>
+        </p:txBody>
+      </p:sp>
+      <p:sp>
+        <p:nvSpPr>
+          <p:cNvPr id="151" name="Google Shape;151;g37e4d9bba6d_0_46"/>
+          <p:cNvSpPr/>
+          <p:nvPr/>
+        </p:nvSpPr>
+        <p:spPr>
+          <a:xfrm flipH="1" rot="10800000">
+            <a:off x="617539" y="1197720"/>
+            <a:ext cx="192000" cy="108000"/>
+          </a:xfrm>
+          <a:prstGeom prst="triangle">
+            <a:avLst>
+              <a:gd fmla="val 50000" name="adj"/>
+            </a:avLst>
+          </a:prstGeom>
+          <a:solidFill>
+            <a:srgbClr val="0089CF">
+              <a:alpha val="87840"/>
+            </a:srgbClr>
+          </a:solidFill>
+          <a:ln>
+            <a:noFill/>
+          </a:ln>
+          <a:effectLst>
+            <a:outerShdw blurRad="50799" rotWithShape="0" algn="ctr" dir="5400000" dist="38100">
+              <a:srgbClr val="A6A6A6">
+                <a:alpha val="40000"/>
+              </a:srgbClr>
+            </a:outerShdw>
+          </a:effectLst>
+        </p:spPr>
+        <p:txBody>
+          <a:bodyPr anchorCtr="0" anchor="ctr" bIns="45700" lIns="91425" spcFirstLastPara="1" rIns="91425" wrap="square" tIns="45700">
+            <a:noAutofit/>
+          </a:bodyPr>
+          <a:lstStyle/>
+          <a:p>
+            <a:pPr indent="0" lvl="0" marL="0" marR="0" rtl="0" algn="ctr">
+              <a:lnSpc>
+                <a:spcPct val="100000"/>
+              </a:lnSpc>
+              <a:spcBef>
+                <a:spcPts val="0"/>
+              </a:spcBef>
+              <a:spcAft>
+                <a:spcPts val="0"/>
+              </a:spcAft>
+              <a:buClr>
+                <a:srgbClr val="000000"/>
+              </a:buClr>
+              <a:buSzPts val="1800"/>
+              <a:buFont typeface="Arial"/>
+              <a:buNone/>
+            </a:pPr>
+            <a:r>
+              <a:t/>
+            </a:r>
+            <a:endParaRPr b="0" i="0" sz="1800" u="none" cap="none" strike="noStrike">
+              <a:solidFill>
+                <a:srgbClr val="FFFFFF"/>
+              </a:solidFill>
+              <a:latin typeface="Lato Light"/>
+              <a:ea typeface="Lato Light"/>
+              <a:cs typeface="Lato Light"/>
+              <a:sym typeface="Lato Light"/>
+            </a:endParaRPr>
+          </a:p>
+        </p:txBody>
+      </p:sp>
+      <p:sp>
+        <p:nvSpPr>
+          <p:cNvPr id="152" name="Google Shape;152;g37e4d9bba6d_0_46"/>
+          <p:cNvSpPr txBox="1"/>
+          <p:nvPr/>
+        </p:nvSpPr>
+        <p:spPr>
+          <a:xfrm>
+            <a:off x="107504" y="116631"/>
+            <a:ext cx="8928900" cy="1080000"/>
+          </a:xfrm>
+          <a:prstGeom prst="rect">
+            <a:avLst/>
+          </a:prstGeom>
+          <a:solidFill>
+            <a:srgbClr val="0089CF">
+              <a:alpha val="87840"/>
+            </a:srgbClr>
+          </a:solidFill>
+          <a:ln>
+            <a:noFill/>
+          </a:ln>
+          <a:effectLst>
+            <a:outerShdw blurRad="50799" rotWithShape="0" algn="ctr" dir="5400000" dist="38100">
+              <a:srgbClr val="A6A6A6">
+                <a:alpha val="40000"/>
+              </a:srgbClr>
+            </a:outerShdw>
+          </a:effectLst>
+        </p:spPr>
+        <p:txBody>
+          <a:bodyPr anchorCtr="0" anchor="ctr" bIns="72000" lIns="288000" spcFirstLastPara="1" rIns="72000" wrap="square" tIns="144000">
+            <a:noAutofit/>
+          </a:bodyPr>
+          <a:lstStyle/>
+          <a:p>
+            <a:pPr indent="0" lvl="0" marL="0" marR="0" rtl="0" algn="l">
+              <a:lnSpc>
+                <a:spcPct val="100000"/>
+              </a:lnSpc>
+              <a:spcBef>
+                <a:spcPts val="0"/>
+              </a:spcBef>
+              <a:spcAft>
+                <a:spcPts val="0"/>
+              </a:spcAft>
+              <a:buClr>
+                <a:schemeClr val="lt1"/>
+              </a:buClr>
+              <a:buSzPts val="800"/>
+              <a:buFont typeface="Lato Light"/>
+              <a:buNone/>
+            </a:pPr>
+            <a:r>
+              <a:rPr b="1" lang="en-GB" sz="3000">
+                <a:solidFill>
+                  <a:schemeClr val="lt1"/>
+                </a:solidFill>
+                <a:latin typeface="Calibri"/>
+                <a:ea typeface="Calibri"/>
+                <a:cs typeface="Calibri"/>
+                <a:sym typeface="Calibri"/>
+              </a:rPr>
+              <a:t>EX 3: Using a New Profiler</a:t>
+            </a:r>
+            <a:endParaRPr b="1" i="0" sz="3000" u="none" cap="none" strike="noStrike">
+              <a:solidFill>
+                <a:srgbClr val="000000"/>
+              </a:solidFill>
+              <a:latin typeface="Calibri"/>
+              <a:ea typeface="Calibri"/>
+              <a:cs typeface="Calibri"/>
+              <a:sym typeface="Calibri"/>
+            </a:endParaRPr>
+          </a:p>
+        </p:txBody>
+      </p:sp>
+      <p:sp>
+        <p:nvSpPr>
+          <p:cNvPr id="153" name="Google Shape;153;g37e4d9bba6d_0_46"/>
+          <p:cNvSpPr txBox="1"/>
+          <p:nvPr/>
+        </p:nvSpPr>
+        <p:spPr>
+          <a:xfrm>
+            <a:off x="422412" y="1478383"/>
+            <a:ext cx="7509600" cy="4677900"/>
+          </a:xfrm>
+          <a:prstGeom prst="rect">
+            <a:avLst/>
+          </a:prstGeom>
+          <a:noFill/>
+          <a:ln>
+            <a:noFill/>
+          </a:ln>
+        </p:spPr>
+        <p:txBody>
+          <a:bodyPr anchorCtr="0" anchor="t" bIns="91425" lIns="91425" spcFirstLastPara="1" rIns="91425" wrap="square" tIns="91425">
+            <a:noAutofit/>
+          </a:bodyPr>
+          <a:lstStyle/>
+          <a:p>
+            <a:pPr indent="0" lvl="0" marL="0" marR="0" rtl="0" algn="l">
+              <a:lnSpc>
+                <a:spcPct val="100000"/>
+              </a:lnSpc>
+              <a:spcBef>
+                <a:spcPts val="0"/>
+              </a:spcBef>
+              <a:spcAft>
+                <a:spcPts val="0"/>
+              </a:spcAft>
+              <a:buClr>
+                <a:srgbClr val="000000"/>
+              </a:buClr>
+              <a:buSzPts val="1800"/>
+              <a:buFont typeface="Arial"/>
+              <a:buNone/>
+            </a:pPr>
+            <a:r>
               <a:rPr b="1" lang="en-GB" sz="2000">
                 <a:latin typeface="Calibri"/>
                 <a:ea typeface="Calibri"/>
                 <a:cs typeface="Calibri"/>
                 <a:sym typeface="Calibri"/>
               </a:rPr>
-              <a:t>Step 2</a:t>
+              <a:t>Other profilers available:</a:t>
             </a:r>
             <a:r>
               <a:rPr lang="en-GB" sz="2000">
@@ -8335,7 +9479,100 @@
                 <a:cs typeface="Calibri"/>
                 <a:sym typeface="Calibri"/>
               </a:rPr>
-              <a:t> - Configure your profiler  as needed, with the appropriate data points or config file.</a:t>
+              <a:t> </a:t>
+            </a:r>
+            <a:r>
+              <a:rPr lang="en-GB" sz="1700">
+                <a:latin typeface="Courier New"/>
+                <a:ea typeface="Courier New"/>
+                <a:cs typeface="Courier New"/>
+                <a:sym typeface="Courier New"/>
+              </a:rPr>
+              <a:t>android</a:t>
+            </a:r>
+            <a:r>
+              <a:rPr lang="en-GB" sz="2200">
+                <a:latin typeface="Calibri"/>
+                <a:ea typeface="Calibri"/>
+                <a:cs typeface="Calibri"/>
+                <a:sym typeface="Calibri"/>
+              </a:rPr>
+              <a:t> </a:t>
+            </a:r>
+            <a:r>
+              <a:rPr lang="en-GB" sz="1700">
+                <a:latin typeface="Courier New"/>
+                <a:ea typeface="Courier New"/>
+                <a:cs typeface="Courier New"/>
+                <a:sym typeface="Courier New"/>
+              </a:rPr>
+              <a:t>system tools, BatteryManager, Frametimes, Garbage Collection, Perfume JS (JS Engine Profiling)</a:t>
+            </a:r>
+            <a:endParaRPr sz="1700">
+              <a:latin typeface="Courier New"/>
+              <a:ea typeface="Courier New"/>
+              <a:cs typeface="Courier New"/>
+              <a:sym typeface="Courier New"/>
+            </a:endParaRPr>
+          </a:p>
+          <a:p>
+            <a:pPr indent="0" lvl="0" marL="0" marR="0" rtl="0" algn="l">
+              <a:lnSpc>
+                <a:spcPct val="100000"/>
+              </a:lnSpc>
+              <a:spcBef>
+                <a:spcPts val="0"/>
+              </a:spcBef>
+              <a:spcAft>
+                <a:spcPts val="0"/>
+              </a:spcAft>
+              <a:buClr>
+                <a:srgbClr val="000000"/>
+              </a:buClr>
+              <a:buSzPts val="1800"/>
+              <a:buFont typeface="Arial"/>
+              <a:buNone/>
+            </a:pPr>
+            <a:r>
+              <a:t/>
+            </a:r>
+            <a:endParaRPr sz="1700">
+              <a:latin typeface="Courier New"/>
+              <a:ea typeface="Courier New"/>
+              <a:cs typeface="Courier New"/>
+              <a:sym typeface="Courier New"/>
+            </a:endParaRPr>
+          </a:p>
+          <a:p>
+            <a:pPr indent="0" lvl="0" marL="0" marR="0" rtl="0" algn="l">
+              <a:lnSpc>
+                <a:spcPct val="100000"/>
+              </a:lnSpc>
+              <a:spcBef>
+                <a:spcPts val="0"/>
+              </a:spcBef>
+              <a:spcAft>
+                <a:spcPts val="0"/>
+              </a:spcAft>
+              <a:buNone/>
+            </a:pPr>
+            <a:r>
+              <a:rPr b="1" lang="en-GB" sz="2000">
+                <a:latin typeface="Calibri"/>
+                <a:ea typeface="Calibri"/>
+                <a:cs typeface="Calibri"/>
+                <a:sym typeface="Calibri"/>
+              </a:rPr>
+              <a:t>Step 1</a:t>
+            </a:r>
+            <a:r>
+              <a:rPr lang="en-GB" sz="2000">
+                <a:latin typeface="Calibri"/>
+                <a:ea typeface="Calibri"/>
+                <a:cs typeface="Calibri"/>
+                <a:sym typeface="Calibri"/>
+              </a:rPr>
+              <a:t> - Add your newly selected profiler to android runner with the appropriate entry in the config file.</a:t>
             </a:r>
             <a:endParaRPr sz="2000">
               <a:latin typeface="Calibri"/>
@@ -8366,7 +9603,42 @@
                 <a:cs typeface="Calibri"/>
                 <a:sym typeface="Calibri"/>
               </a:rPr>
-              <a:t>Check the examples provided with android-runner for good starting points</a:t>
+              <a:t>Some Profiler require additional dependencies like </a:t>
+            </a:r>
+            <a:r>
+              <a:rPr lang="en-GB" sz="1700" u="sng">
+                <a:solidFill>
+                  <a:schemeClr val="hlink"/>
+                </a:solidFill>
+                <a:latin typeface="Calibri"/>
+                <a:ea typeface="Calibri"/>
+                <a:cs typeface="Calibri"/>
+                <a:sym typeface="Calibri"/>
+                <a:hlinkClick r:id="rId3"/>
+              </a:rPr>
+              <a:t>BatteryManager</a:t>
+            </a:r>
+            <a:r>
+              <a:rPr lang="en-GB" sz="1700">
+                <a:latin typeface="Calibri"/>
+                <a:ea typeface="Calibri"/>
+                <a:cs typeface="Calibri"/>
+                <a:sym typeface="Calibri"/>
+              </a:rPr>
+              <a:t> and </a:t>
+            </a:r>
+            <a:r>
+              <a:rPr lang="en-GB" sz="1700" u="sng">
+                <a:solidFill>
+                  <a:schemeClr val="hlink"/>
+                </a:solidFill>
+                <a:latin typeface="Calibri"/>
+                <a:ea typeface="Calibri"/>
+                <a:cs typeface="Calibri"/>
+                <a:sym typeface="Calibri"/>
+                <a:hlinkClick r:id="rId4"/>
+              </a:rPr>
+              <a:t>Perfume JS</a:t>
             </a:r>
             <a:endParaRPr sz="1700">
               <a:latin typeface="Calibri"/>
@@ -8418,7 +9690,7 @@
                 <a:cs typeface="Calibri"/>
                 <a:sym typeface="Calibri"/>
               </a:rPr>
-              <a:t>Step 3</a:t>
+              <a:t>Step 2</a:t>
             </a:r>
             <a:r>
               <a:rPr lang="en-GB" sz="2000">
@@ -8427,7 +9699,7 @@
                 <a:cs typeface="Calibri"/>
                 <a:sym typeface="Calibri"/>
               </a:rPr>
-              <a:t> - Perform a test run of your experiment to view the data created, and create the processing scripts.</a:t>
+              <a:t> - Configure your profiler  as needed, with the appropriate data points or config file.</a:t>
             </a:r>
             <a:endParaRPr sz="2000">
               <a:latin typeface="Calibri"/>
@@ -8458,9 +9730,1411 @@
                 <a:cs typeface="Calibri"/>
                 <a:sym typeface="Calibri"/>
               </a:rPr>
+              <a:t>Check the examples provided with android-runner for good starting points</a:t>
+            </a:r>
+            <a:endParaRPr sz="1700">
+              <a:latin typeface="Calibri"/>
+              <a:ea typeface="Calibri"/>
+              <a:cs typeface="Calibri"/>
+              <a:sym typeface="Calibri"/>
+            </a:endParaRPr>
+          </a:p>
+          <a:p>
+            <a:pPr indent="0" lvl="0" marL="0" marR="0" rtl="0" algn="l">
+              <a:lnSpc>
+                <a:spcPct val="100000"/>
+              </a:lnSpc>
+              <a:spcBef>
+                <a:spcPts val="0"/>
+              </a:spcBef>
+              <a:spcAft>
+                <a:spcPts val="0"/>
+              </a:spcAft>
+              <a:buNone/>
+            </a:pPr>
+            <a:r>
+              <a:t/>
+            </a:r>
+            <a:endParaRPr sz="1700">
+              <a:latin typeface="Calibri"/>
+              <a:ea typeface="Calibri"/>
+              <a:cs typeface="Calibri"/>
+              <a:sym typeface="Calibri"/>
+            </a:endParaRPr>
+          </a:p>
+          <a:p>
+            <a:pPr indent="0" lvl="0" marL="0" marR="0" rtl="0" algn="l">
+              <a:lnSpc>
+                <a:spcPct val="100000"/>
+              </a:lnSpc>
+              <a:spcBef>
+                <a:spcPts val="0"/>
+              </a:spcBef>
+              <a:spcAft>
+                <a:spcPts val="0"/>
+              </a:spcAft>
+              <a:buNone/>
+            </a:pPr>
+            <a:r>
+              <a:rPr b="1" lang="en-GB" sz="2000">
+                <a:latin typeface="Calibri"/>
+                <a:ea typeface="Calibri"/>
+                <a:cs typeface="Calibri"/>
+                <a:sym typeface="Calibri"/>
+              </a:rPr>
+              <a:t>Step 3</a:t>
+            </a:r>
+            <a:r>
+              <a:rPr lang="en-GB" sz="2000">
+                <a:latin typeface="Calibri"/>
+                <a:ea typeface="Calibri"/>
+                <a:cs typeface="Calibri"/>
+                <a:sym typeface="Calibri"/>
+              </a:rPr>
+              <a:t> - Perform a test run of your experiment to view the data created, and create the processing scripts.</a:t>
+            </a:r>
+            <a:endParaRPr sz="2000">
+              <a:latin typeface="Calibri"/>
+              <a:ea typeface="Calibri"/>
+              <a:cs typeface="Calibri"/>
+              <a:sym typeface="Calibri"/>
+            </a:endParaRPr>
+          </a:p>
+          <a:p>
+            <a:pPr indent="-336550" lvl="0" marL="457200" marR="0" rtl="0" algn="l">
+              <a:lnSpc>
+                <a:spcPct val="100000"/>
+              </a:lnSpc>
+              <a:spcBef>
+                <a:spcPts val="0"/>
+              </a:spcBef>
+              <a:spcAft>
+                <a:spcPts val="0"/>
+              </a:spcAft>
+              <a:buSzPts val="1700"/>
+              <a:buFont typeface="Calibri"/>
+              <a:buChar char="-"/>
+            </a:pPr>
+            <a:r>
+              <a:rPr lang="en-GB" sz="1700">
+                <a:latin typeface="Calibri"/>
+                <a:ea typeface="Calibri"/>
+                <a:cs typeface="Calibri"/>
+                <a:sym typeface="Calibri"/>
+              </a:rPr>
               <a:t>The different profiler produce different outputs, check how you can work with the resulting data e.g. csv, pandas, proprietary library</a:t>
             </a:r>
             <a:endParaRPr sz="1700">
+              <a:latin typeface="Calibri"/>
+              <a:ea typeface="Calibri"/>
+              <a:cs typeface="Calibri"/>
+              <a:sym typeface="Calibri"/>
+            </a:endParaRPr>
+          </a:p>
+        </p:txBody>
+      </p:sp>
+    </p:spTree>
+  </p:cSld>
+  <p:clrMapOvr>
+    <a:masterClrMapping/>
+  </p:clrMapOvr>
+</p:sld>
+</file>
+
+<file path=ppt/slides/slide13.xml><?xml version="1.0" encoding="utf-8"?>
+<p:sld xmlns:a="http://schemas.openxmlformats.org/drawingml/2006/main" xmlns:r="http://schemas.openxmlformats.org/officeDocument/2006/relationships" xmlns:mc="http://schemas.openxmlformats.org/markup-compatibility/2006" xmlns:mv="urn:schemas-microsoft-com:mac:vml" xmlns:p="http://schemas.openxmlformats.org/presentationml/2006/main" xmlns:c="http://schemas.openxmlformats.org/drawingml/2006/chart" xmlns:dgm="http://schemas.openxmlformats.org/drawingml/2006/diagram" xmlns:o="urn:schemas-microsoft-com:office:office" xmlns:v="urn:schemas-microsoft-com:vml" xmlns:pvml="urn:schemas-microsoft-com:office:powerpoint" xmlns:com="http://schemas.openxmlformats.org/drawingml/2006/compatibility" xmlns:p14="http://schemas.microsoft.com/office/powerpoint/2010/main" xmlns:p15="http://schemas.microsoft.com/office/powerpoint/2012/main" xmlns:ahyp="http://schemas.microsoft.com/office/drawing/2018/hyperlinkcolor">
+  <p:cSld>
+    <p:spTree>
+      <p:nvGrpSpPr>
+        <p:cNvPr id="157" name="Shape 157"/>
+        <p:cNvGrpSpPr/>
+        <p:nvPr/>
+      </p:nvGrpSpPr>
+      <p:grpSpPr>
+        <a:xfrm>
+          <a:off x="0" y="0"/>
+          <a:ext cx="0" cy="0"/>
+          <a:chOff x="0" y="0"/>
+          <a:chExt cx="0" cy="0"/>
+        </a:xfrm>
+      </p:grpSpPr>
+      <p:sp>
+        <p:nvSpPr>
+          <p:cNvPr id="158" name="Google Shape;158;g37fcc201e2e_1_11"/>
+          <p:cNvSpPr txBox="1"/>
+          <p:nvPr/>
+        </p:nvSpPr>
+        <p:spPr>
+          <a:xfrm>
+            <a:off x="2" y="6453335"/>
+            <a:ext cx="611100" cy="404400"/>
+          </a:xfrm>
+          <a:prstGeom prst="rect">
+            <a:avLst/>
+          </a:prstGeom>
+          <a:noFill/>
+          <a:ln>
+            <a:noFill/>
+          </a:ln>
+        </p:spPr>
+        <p:txBody>
+          <a:bodyPr anchorCtr="0" anchor="t" bIns="0" lIns="0" spcFirstLastPara="1" rIns="0" wrap="square" tIns="0">
+            <a:noAutofit/>
+          </a:bodyPr>
+          <a:lstStyle/>
+          <a:p>
+            <a:pPr indent="-4758" lvl="0" marL="271462" marR="0" rtl="0" algn="l">
+              <a:lnSpc>
+                <a:spcPct val="100000"/>
+              </a:lnSpc>
+              <a:spcBef>
+                <a:spcPts val="0"/>
+              </a:spcBef>
+              <a:spcAft>
+                <a:spcPts val="0"/>
+              </a:spcAft>
+              <a:buClr>
+                <a:schemeClr val="dk1"/>
+              </a:buClr>
+              <a:buSzPts val="300"/>
+              <a:buFont typeface="Lato Light"/>
+              <a:buNone/>
+            </a:pPr>
+            <a:fld id="{00000000-1234-1234-1234-123412341234}" type="slidenum">
+              <a:rPr b="0" i="0" lang="en-GB" sz="1200" u="none" cap="none" strike="noStrike">
+                <a:solidFill>
+                  <a:schemeClr val="dk1"/>
+                </a:solidFill>
+                <a:latin typeface="Lato Light"/>
+                <a:ea typeface="Lato Light"/>
+                <a:cs typeface="Lato Light"/>
+                <a:sym typeface="Lato Light"/>
+              </a:rPr>
+              <a:t>‹#›</a:t>
+            </a:fld>
+            <a:endParaRPr b="0" i="0" sz="1200" u="none" cap="none" strike="noStrike">
+              <a:solidFill>
+                <a:schemeClr val="dk1"/>
+              </a:solidFill>
+              <a:latin typeface="Lato Light"/>
+              <a:ea typeface="Lato Light"/>
+              <a:cs typeface="Lato Light"/>
+              <a:sym typeface="Lato Light"/>
+            </a:endParaRPr>
+          </a:p>
+        </p:txBody>
+      </p:sp>
+      <p:sp>
+        <p:nvSpPr>
+          <p:cNvPr id="159" name="Google Shape;159;g37fcc201e2e_1_11"/>
+          <p:cNvSpPr/>
+          <p:nvPr/>
+        </p:nvSpPr>
+        <p:spPr>
+          <a:xfrm flipH="1" rot="10800000">
+            <a:off x="617539" y="1197720"/>
+            <a:ext cx="192000" cy="108000"/>
+          </a:xfrm>
+          <a:prstGeom prst="triangle">
+            <a:avLst>
+              <a:gd fmla="val 50000" name="adj"/>
+            </a:avLst>
+          </a:prstGeom>
+          <a:solidFill>
+            <a:srgbClr val="0089CF">
+              <a:alpha val="87840"/>
+            </a:srgbClr>
+          </a:solidFill>
+          <a:ln>
+            <a:noFill/>
+          </a:ln>
+          <a:effectLst>
+            <a:outerShdw blurRad="50799" rotWithShape="0" algn="ctr" dir="5400000" dist="38100">
+              <a:srgbClr val="A6A6A6">
+                <a:alpha val="40000"/>
+              </a:srgbClr>
+            </a:outerShdw>
+          </a:effectLst>
+        </p:spPr>
+        <p:txBody>
+          <a:bodyPr anchorCtr="0" anchor="ctr" bIns="45700" lIns="91425" spcFirstLastPara="1" rIns="91425" wrap="square" tIns="45700">
+            <a:noAutofit/>
+          </a:bodyPr>
+          <a:lstStyle/>
+          <a:p>
+            <a:pPr indent="0" lvl="0" marL="0" marR="0" rtl="0" algn="ctr">
+              <a:lnSpc>
+                <a:spcPct val="100000"/>
+              </a:lnSpc>
+              <a:spcBef>
+                <a:spcPts val="0"/>
+              </a:spcBef>
+              <a:spcAft>
+                <a:spcPts val="0"/>
+              </a:spcAft>
+              <a:buClr>
+                <a:srgbClr val="000000"/>
+              </a:buClr>
+              <a:buSzPts val="1800"/>
+              <a:buFont typeface="Arial"/>
+              <a:buNone/>
+            </a:pPr>
+            <a:r>
+              <a:t/>
+            </a:r>
+            <a:endParaRPr b="0" i="0" sz="1800" u="none" cap="none" strike="noStrike">
+              <a:solidFill>
+                <a:srgbClr val="FFFFFF"/>
+              </a:solidFill>
+              <a:latin typeface="Lato Light"/>
+              <a:ea typeface="Lato Light"/>
+              <a:cs typeface="Lato Light"/>
+              <a:sym typeface="Lato Light"/>
+            </a:endParaRPr>
+          </a:p>
+        </p:txBody>
+      </p:sp>
+      <p:sp>
+        <p:nvSpPr>
+          <p:cNvPr id="160" name="Google Shape;160;g37fcc201e2e_1_11"/>
+          <p:cNvSpPr txBox="1"/>
+          <p:nvPr/>
+        </p:nvSpPr>
+        <p:spPr>
+          <a:xfrm>
+            <a:off x="107504" y="116631"/>
+            <a:ext cx="8928900" cy="1080000"/>
+          </a:xfrm>
+          <a:prstGeom prst="rect">
+            <a:avLst/>
+          </a:prstGeom>
+          <a:solidFill>
+            <a:srgbClr val="0089CF">
+              <a:alpha val="87840"/>
+            </a:srgbClr>
+          </a:solidFill>
+          <a:ln>
+            <a:noFill/>
+          </a:ln>
+          <a:effectLst>
+            <a:outerShdw blurRad="50799" rotWithShape="0" algn="ctr" dir="5400000" dist="38100">
+              <a:srgbClr val="A6A6A6">
+                <a:alpha val="40000"/>
+              </a:srgbClr>
+            </a:outerShdw>
+          </a:effectLst>
+        </p:spPr>
+        <p:txBody>
+          <a:bodyPr anchorCtr="0" anchor="ctr" bIns="72000" lIns="288000" spcFirstLastPara="1" rIns="72000" wrap="square" tIns="144000">
+            <a:noAutofit/>
+          </a:bodyPr>
+          <a:lstStyle/>
+          <a:p>
+            <a:pPr indent="0" lvl="0" marL="0" marR="0" rtl="0" algn="l">
+              <a:lnSpc>
+                <a:spcPct val="100000"/>
+              </a:lnSpc>
+              <a:spcBef>
+                <a:spcPts val="0"/>
+              </a:spcBef>
+              <a:spcAft>
+                <a:spcPts val="0"/>
+              </a:spcAft>
+              <a:buClr>
+                <a:schemeClr val="lt1"/>
+              </a:buClr>
+              <a:buSzPts val="800"/>
+              <a:buFont typeface="Lato Light"/>
+              <a:buNone/>
+            </a:pPr>
+            <a:r>
+              <a:rPr b="1" lang="en-GB" sz="3000">
+                <a:solidFill>
+                  <a:schemeClr val="lt1"/>
+                </a:solidFill>
+                <a:latin typeface="Calibri"/>
+                <a:ea typeface="Calibri"/>
+                <a:cs typeface="Calibri"/>
+                <a:sym typeface="Calibri"/>
+              </a:rPr>
+              <a:t>EX 3: Using a New Profiler Example</a:t>
+            </a:r>
+            <a:endParaRPr b="1" i="0" sz="3000" u="none" cap="none" strike="noStrike">
+              <a:solidFill>
+                <a:srgbClr val="000000"/>
+              </a:solidFill>
+              <a:latin typeface="Calibri"/>
+              <a:ea typeface="Calibri"/>
+              <a:cs typeface="Calibri"/>
+              <a:sym typeface="Calibri"/>
+            </a:endParaRPr>
+          </a:p>
+        </p:txBody>
+      </p:sp>
+      <p:sp>
+        <p:nvSpPr>
+          <p:cNvPr id="161" name="Google Shape;161;g37fcc201e2e_1_11"/>
+          <p:cNvSpPr txBox="1"/>
+          <p:nvPr/>
+        </p:nvSpPr>
+        <p:spPr>
+          <a:xfrm>
+            <a:off x="422398" y="1478375"/>
+            <a:ext cx="8507700" cy="4677900"/>
+          </a:xfrm>
+          <a:prstGeom prst="rect">
+            <a:avLst/>
+          </a:prstGeom>
+          <a:noFill/>
+          <a:ln>
+            <a:noFill/>
+          </a:ln>
+        </p:spPr>
+        <p:txBody>
+          <a:bodyPr anchorCtr="0" anchor="t" bIns="91425" lIns="91425" spcFirstLastPara="1" rIns="91425" wrap="square" tIns="91425">
+            <a:noAutofit/>
+          </a:bodyPr>
+          <a:lstStyle/>
+          <a:p>
+            <a:pPr indent="0" lvl="0" marL="0" marR="0" rtl="0" algn="l">
+              <a:lnSpc>
+                <a:spcPct val="100000"/>
+              </a:lnSpc>
+              <a:spcBef>
+                <a:spcPts val="0"/>
+              </a:spcBef>
+              <a:spcAft>
+                <a:spcPts val="0"/>
+              </a:spcAft>
+              <a:buNone/>
+            </a:pPr>
+            <a:r>
+              <a:rPr b="1" lang="en-GB" sz="2000">
+                <a:latin typeface="Calibri"/>
+                <a:ea typeface="Calibri"/>
+                <a:cs typeface="Calibri"/>
+                <a:sym typeface="Calibri"/>
+              </a:rPr>
+              <a:t>Configuring the profiler:</a:t>
+            </a:r>
+            <a:br>
+              <a:rPr b="1" lang="en-GB" sz="2000">
+                <a:latin typeface="Calibri"/>
+                <a:ea typeface="Calibri"/>
+                <a:cs typeface="Calibri"/>
+                <a:sym typeface="Calibri"/>
+              </a:rPr>
+            </a:br>
+            <a:r>
+              <a:rPr lang="en-GB" sz="1700">
+                <a:solidFill>
+                  <a:srgbClr val="DD1144"/>
+                </a:solidFill>
+                <a:latin typeface="Calibri"/>
+                <a:ea typeface="Calibri"/>
+                <a:cs typeface="Calibri"/>
+                <a:sym typeface="Calibri"/>
+              </a:rPr>
+              <a:t>"Android"</a:t>
+            </a:r>
+            <a:r>
+              <a:rPr lang="en-GB" sz="1700">
+                <a:solidFill>
+                  <a:srgbClr val="333333"/>
+                </a:solidFill>
+                <a:latin typeface="Calibri"/>
+                <a:ea typeface="Calibri"/>
+                <a:cs typeface="Calibri"/>
+                <a:sym typeface="Calibri"/>
+              </a:rPr>
+              <a:t>: {</a:t>
+            </a:r>
+            <a:endParaRPr sz="1700">
+              <a:solidFill>
+                <a:srgbClr val="333333"/>
+              </a:solidFill>
+              <a:latin typeface="Calibri"/>
+              <a:ea typeface="Calibri"/>
+              <a:cs typeface="Calibri"/>
+              <a:sym typeface="Calibri"/>
+            </a:endParaRPr>
+          </a:p>
+          <a:p>
+            <a:pPr indent="0" lvl="0" marL="0" marR="0" rtl="0" algn="l">
+              <a:lnSpc>
+                <a:spcPct val="100000"/>
+              </a:lnSpc>
+              <a:spcBef>
+                <a:spcPts val="0"/>
+              </a:spcBef>
+              <a:spcAft>
+                <a:spcPts val="0"/>
+              </a:spcAft>
+              <a:buNone/>
+            </a:pPr>
+            <a:r>
+              <a:rPr lang="en-GB" sz="1700">
+                <a:solidFill>
+                  <a:srgbClr val="333333"/>
+                </a:solidFill>
+                <a:latin typeface="Calibri"/>
+                <a:ea typeface="Calibri"/>
+                <a:cs typeface="Calibri"/>
+                <a:sym typeface="Calibri"/>
+              </a:rPr>
+              <a:t>  </a:t>
+            </a:r>
+            <a:r>
+              <a:rPr lang="en-GB" sz="1700">
+                <a:solidFill>
+                  <a:srgbClr val="DD1144"/>
+                </a:solidFill>
+                <a:latin typeface="Calibri"/>
+                <a:ea typeface="Calibri"/>
+                <a:cs typeface="Calibri"/>
+                <a:sym typeface="Calibri"/>
+              </a:rPr>
+              <a:t>"subject_aggregation"</a:t>
+            </a:r>
+            <a:r>
+              <a:rPr lang="en-GB" sz="1700">
+                <a:solidFill>
+                  <a:srgbClr val="333333"/>
+                </a:solidFill>
+                <a:latin typeface="Calibri"/>
+                <a:ea typeface="Calibri"/>
+                <a:cs typeface="Calibri"/>
+                <a:sym typeface="Calibri"/>
+              </a:rPr>
+              <a:t>: </a:t>
+            </a:r>
+            <a:r>
+              <a:rPr lang="en-GB" sz="1700">
+                <a:solidFill>
+                  <a:srgbClr val="DD1144"/>
+                </a:solidFill>
+                <a:latin typeface="Calibri"/>
+                <a:ea typeface="Calibri"/>
+                <a:cs typeface="Calibri"/>
+                <a:sym typeface="Calibri"/>
+              </a:rPr>
+              <a:t>"none"</a:t>
+            </a:r>
+            <a:r>
+              <a:rPr lang="en-GB" sz="1700">
+                <a:solidFill>
+                  <a:srgbClr val="333333"/>
+                </a:solidFill>
+                <a:latin typeface="Calibri"/>
+                <a:ea typeface="Calibri"/>
+                <a:cs typeface="Calibri"/>
+                <a:sym typeface="Calibri"/>
+              </a:rPr>
+              <a:t>,</a:t>
+            </a:r>
+            <a:endParaRPr sz="1700">
+              <a:solidFill>
+                <a:srgbClr val="333333"/>
+              </a:solidFill>
+              <a:latin typeface="Calibri"/>
+              <a:ea typeface="Calibri"/>
+              <a:cs typeface="Calibri"/>
+              <a:sym typeface="Calibri"/>
+            </a:endParaRPr>
+          </a:p>
+          <a:p>
+            <a:pPr indent="0" lvl="0" marL="0" marR="0" rtl="0" algn="l">
+              <a:lnSpc>
+                <a:spcPct val="100000"/>
+              </a:lnSpc>
+              <a:spcBef>
+                <a:spcPts val="0"/>
+              </a:spcBef>
+              <a:spcAft>
+                <a:spcPts val="0"/>
+              </a:spcAft>
+              <a:buNone/>
+            </a:pPr>
+            <a:r>
+              <a:rPr lang="en-GB" sz="1700">
+                <a:solidFill>
+                  <a:srgbClr val="333333"/>
+                </a:solidFill>
+                <a:latin typeface="Calibri"/>
+                <a:ea typeface="Calibri"/>
+                <a:cs typeface="Calibri"/>
+                <a:sym typeface="Calibri"/>
+              </a:rPr>
+              <a:t>  </a:t>
+            </a:r>
+            <a:r>
+              <a:rPr lang="en-GB" sz="1700">
+                <a:solidFill>
+                  <a:srgbClr val="DD1144"/>
+                </a:solidFill>
+                <a:latin typeface="Calibri"/>
+                <a:ea typeface="Calibri"/>
+                <a:cs typeface="Calibri"/>
+                <a:sym typeface="Calibri"/>
+              </a:rPr>
+              <a:t>"experiment_aggregation"</a:t>
+            </a:r>
+            <a:r>
+              <a:rPr lang="en-GB" sz="1700">
+                <a:solidFill>
+                  <a:srgbClr val="333333"/>
+                </a:solidFill>
+                <a:latin typeface="Calibri"/>
+                <a:ea typeface="Calibri"/>
+                <a:cs typeface="Calibri"/>
+                <a:sym typeface="Calibri"/>
+              </a:rPr>
+              <a:t> : </a:t>
+            </a:r>
+            <a:r>
+              <a:rPr lang="en-GB" sz="1700">
+                <a:solidFill>
+                  <a:srgbClr val="DD1144"/>
+                </a:solidFill>
+                <a:latin typeface="Calibri"/>
+                <a:ea typeface="Calibri"/>
+                <a:cs typeface="Calibri"/>
+                <a:sym typeface="Calibri"/>
+              </a:rPr>
+              <a:t>"none"</a:t>
+            </a:r>
+            <a:r>
+              <a:rPr lang="en-GB" sz="1700">
+                <a:solidFill>
+                  <a:srgbClr val="333333"/>
+                </a:solidFill>
+                <a:latin typeface="Calibri"/>
+                <a:ea typeface="Calibri"/>
+                <a:cs typeface="Calibri"/>
+                <a:sym typeface="Calibri"/>
+              </a:rPr>
+              <a:t>,</a:t>
+            </a:r>
+            <a:endParaRPr sz="1700">
+              <a:solidFill>
+                <a:srgbClr val="333333"/>
+              </a:solidFill>
+              <a:latin typeface="Calibri"/>
+              <a:ea typeface="Calibri"/>
+              <a:cs typeface="Calibri"/>
+              <a:sym typeface="Calibri"/>
+            </a:endParaRPr>
+          </a:p>
+          <a:p>
+            <a:pPr indent="0" lvl="0" marL="0" marR="0" rtl="0" algn="l">
+              <a:lnSpc>
+                <a:spcPct val="100000"/>
+              </a:lnSpc>
+              <a:spcBef>
+                <a:spcPts val="0"/>
+              </a:spcBef>
+              <a:spcAft>
+                <a:spcPts val="0"/>
+              </a:spcAft>
+              <a:buNone/>
+            </a:pPr>
+            <a:r>
+              <a:rPr lang="en-GB" sz="1700">
+                <a:solidFill>
+                  <a:srgbClr val="333333"/>
+                </a:solidFill>
+                <a:latin typeface="Calibri"/>
+                <a:ea typeface="Calibri"/>
+                <a:cs typeface="Calibri"/>
+                <a:sym typeface="Calibri"/>
+              </a:rPr>
+              <a:t>  </a:t>
+            </a:r>
+            <a:r>
+              <a:rPr lang="en-GB" sz="1700">
+                <a:solidFill>
+                  <a:srgbClr val="DD1144"/>
+                </a:solidFill>
+                <a:latin typeface="Calibri"/>
+                <a:ea typeface="Calibri"/>
+                <a:cs typeface="Calibri"/>
+                <a:sym typeface="Calibri"/>
+              </a:rPr>
+              <a:t>"sample_interval"</a:t>
+            </a:r>
+            <a:r>
+              <a:rPr lang="en-GB" sz="1700">
+                <a:solidFill>
+                  <a:srgbClr val="333333"/>
+                </a:solidFill>
+                <a:latin typeface="Calibri"/>
+                <a:ea typeface="Calibri"/>
+                <a:cs typeface="Calibri"/>
+                <a:sym typeface="Calibri"/>
+              </a:rPr>
+              <a:t>: </a:t>
+            </a:r>
+            <a:r>
+              <a:rPr lang="en-GB" sz="1700">
+                <a:solidFill>
+                  <a:srgbClr val="008080"/>
+                </a:solidFill>
+                <a:latin typeface="Calibri"/>
+                <a:ea typeface="Calibri"/>
+                <a:cs typeface="Calibri"/>
+                <a:sym typeface="Calibri"/>
+              </a:rPr>
+              <a:t>0</a:t>
+            </a:r>
+            <a:r>
+              <a:rPr lang="en-GB" sz="1700">
+                <a:solidFill>
+                  <a:srgbClr val="333333"/>
+                </a:solidFill>
+                <a:latin typeface="Calibri"/>
+                <a:ea typeface="Calibri"/>
+                <a:cs typeface="Calibri"/>
+                <a:sym typeface="Calibri"/>
+              </a:rPr>
+              <a:t>,</a:t>
+            </a:r>
+            <a:endParaRPr sz="1700">
+              <a:solidFill>
+                <a:srgbClr val="333333"/>
+              </a:solidFill>
+              <a:latin typeface="Calibri"/>
+              <a:ea typeface="Calibri"/>
+              <a:cs typeface="Calibri"/>
+              <a:sym typeface="Calibri"/>
+            </a:endParaRPr>
+          </a:p>
+          <a:p>
+            <a:pPr indent="0" lvl="0" marL="0" marR="0" rtl="0" algn="l">
+              <a:lnSpc>
+                <a:spcPct val="100000"/>
+              </a:lnSpc>
+              <a:spcBef>
+                <a:spcPts val="0"/>
+              </a:spcBef>
+              <a:spcAft>
+                <a:spcPts val="0"/>
+              </a:spcAft>
+              <a:buNone/>
+            </a:pPr>
+            <a:r>
+              <a:rPr lang="en-GB" sz="1700">
+                <a:solidFill>
+                  <a:srgbClr val="333333"/>
+                </a:solidFill>
+                <a:latin typeface="Calibri"/>
+                <a:ea typeface="Calibri"/>
+                <a:cs typeface="Calibri"/>
+                <a:sym typeface="Calibri"/>
+              </a:rPr>
+              <a:t>  </a:t>
+            </a:r>
+            <a:r>
+              <a:rPr lang="en-GB" sz="1700">
+                <a:solidFill>
+                  <a:srgbClr val="DD1144"/>
+                </a:solidFill>
+                <a:latin typeface="Calibri"/>
+                <a:ea typeface="Calibri"/>
+                <a:cs typeface="Calibri"/>
+                <a:sym typeface="Calibri"/>
+              </a:rPr>
+              <a:t>"data_points"</a:t>
+            </a:r>
+            <a:r>
+              <a:rPr lang="en-GB" sz="1700">
+                <a:solidFill>
+                  <a:srgbClr val="333333"/>
+                </a:solidFill>
+                <a:latin typeface="Calibri"/>
+                <a:ea typeface="Calibri"/>
+                <a:cs typeface="Calibri"/>
+                <a:sym typeface="Calibri"/>
+              </a:rPr>
+              <a:t>: [</a:t>
+            </a:r>
+            <a:r>
+              <a:rPr lang="en-GB" sz="1700">
+                <a:solidFill>
+                  <a:srgbClr val="DD1144"/>
+                </a:solidFill>
+                <a:latin typeface="Calibri"/>
+                <a:ea typeface="Calibri"/>
+                <a:cs typeface="Calibri"/>
+                <a:sym typeface="Calibri"/>
+              </a:rPr>
+              <a:t>"cpu"</a:t>
+            </a:r>
+            <a:r>
+              <a:rPr lang="en-GB" sz="1700">
+                <a:solidFill>
+                  <a:srgbClr val="333333"/>
+                </a:solidFill>
+                <a:latin typeface="Calibri"/>
+                <a:ea typeface="Calibri"/>
+                <a:cs typeface="Calibri"/>
+                <a:sym typeface="Calibri"/>
+              </a:rPr>
+              <a:t>, </a:t>
+            </a:r>
+            <a:r>
+              <a:rPr lang="en-GB" sz="1700">
+                <a:solidFill>
+                  <a:srgbClr val="DD1144"/>
+                </a:solidFill>
+                <a:latin typeface="Calibri"/>
+                <a:ea typeface="Calibri"/>
+                <a:cs typeface="Calibri"/>
+                <a:sym typeface="Calibri"/>
+              </a:rPr>
+              <a:t>"mem"</a:t>
+            </a:r>
+            <a:r>
+              <a:rPr lang="en-GB" sz="1700">
+                <a:solidFill>
+                  <a:srgbClr val="333333"/>
+                </a:solidFill>
+                <a:latin typeface="Calibri"/>
+                <a:ea typeface="Calibri"/>
+                <a:cs typeface="Calibri"/>
+                <a:sym typeface="Calibri"/>
+              </a:rPr>
+              <a:t>]</a:t>
+            </a:r>
+            <a:endParaRPr sz="1700">
+              <a:solidFill>
+                <a:srgbClr val="333333"/>
+              </a:solidFill>
+              <a:latin typeface="Calibri"/>
+              <a:ea typeface="Calibri"/>
+              <a:cs typeface="Calibri"/>
+              <a:sym typeface="Calibri"/>
+            </a:endParaRPr>
+          </a:p>
+          <a:p>
+            <a:pPr indent="0" lvl="0" marL="0" marR="0" rtl="0" algn="l">
+              <a:lnSpc>
+                <a:spcPct val="100000"/>
+              </a:lnSpc>
+              <a:spcBef>
+                <a:spcPts val="0"/>
+              </a:spcBef>
+              <a:spcAft>
+                <a:spcPts val="0"/>
+              </a:spcAft>
+              <a:buClr>
+                <a:schemeClr val="dk1"/>
+              </a:buClr>
+              <a:buSzPts val="1100"/>
+              <a:buFont typeface="Arial"/>
+              <a:buNone/>
+            </a:pPr>
+            <a:r>
+              <a:rPr lang="en-GB" sz="1700">
+                <a:solidFill>
+                  <a:srgbClr val="333333"/>
+                </a:solidFill>
+                <a:latin typeface="Calibri"/>
+                <a:ea typeface="Calibri"/>
+                <a:cs typeface="Calibri"/>
+                <a:sym typeface="Calibri"/>
+              </a:rPr>
+              <a:t>}</a:t>
+            </a:r>
+            <a:endParaRPr sz="1700">
+              <a:solidFill>
+                <a:srgbClr val="333333"/>
+              </a:solidFill>
+              <a:latin typeface="Calibri"/>
+              <a:ea typeface="Calibri"/>
+              <a:cs typeface="Calibri"/>
+              <a:sym typeface="Calibri"/>
+            </a:endParaRPr>
+          </a:p>
+          <a:p>
+            <a:pPr indent="0" lvl="0" marL="0" marR="0" rtl="0" algn="l">
+              <a:lnSpc>
+                <a:spcPct val="100000"/>
+              </a:lnSpc>
+              <a:spcBef>
+                <a:spcPts val="0"/>
+              </a:spcBef>
+              <a:spcAft>
+                <a:spcPts val="0"/>
+              </a:spcAft>
+              <a:buNone/>
+            </a:pPr>
+            <a:r>
+              <a:t/>
+            </a:r>
+            <a:endParaRPr sz="2000">
+              <a:latin typeface="Calibri"/>
+              <a:ea typeface="Calibri"/>
+              <a:cs typeface="Calibri"/>
+              <a:sym typeface="Calibri"/>
+            </a:endParaRPr>
+          </a:p>
+          <a:p>
+            <a:pPr indent="0" lvl="0" marL="0" marR="0" rtl="0" algn="l">
+              <a:lnSpc>
+                <a:spcPct val="100000"/>
+              </a:lnSpc>
+              <a:spcBef>
+                <a:spcPts val="0"/>
+              </a:spcBef>
+              <a:spcAft>
+                <a:spcPts val="0"/>
+              </a:spcAft>
+              <a:buNone/>
+            </a:pPr>
+            <a:r>
+              <a:rPr b="1" lang="en-GB" sz="2000">
+                <a:latin typeface="Calibri"/>
+                <a:ea typeface="Calibri"/>
+                <a:cs typeface="Calibri"/>
+                <a:sym typeface="Calibri"/>
+              </a:rPr>
+              <a:t>Working with perfetto data and aggregation scripts:</a:t>
+            </a:r>
+            <a:endParaRPr b="1" sz="2000">
+              <a:latin typeface="Calibri"/>
+              <a:ea typeface="Calibri"/>
+              <a:cs typeface="Calibri"/>
+              <a:sym typeface="Calibri"/>
+            </a:endParaRPr>
+          </a:p>
+          <a:p>
+            <a:pPr indent="0" lvl="0" marL="0" rtl="0" algn="l">
+              <a:lnSpc>
+                <a:spcPct val="115000"/>
+              </a:lnSpc>
+              <a:spcBef>
+                <a:spcPts val="0"/>
+              </a:spcBef>
+              <a:spcAft>
+                <a:spcPts val="0"/>
+              </a:spcAft>
+              <a:buClr>
+                <a:schemeClr val="dk1"/>
+              </a:buClr>
+              <a:buSzPts val="1100"/>
+              <a:buFont typeface="Arial"/>
+              <a:buNone/>
+            </a:pPr>
+            <a:r>
+              <a:rPr b="1" lang="en-GB" sz="1700">
+                <a:solidFill>
+                  <a:srgbClr val="333333"/>
+                </a:solidFill>
+                <a:latin typeface="Calibri"/>
+                <a:ea typeface="Calibri"/>
+                <a:cs typeface="Calibri"/>
+                <a:sym typeface="Calibri"/>
+              </a:rPr>
+              <a:t>for</a:t>
+            </a:r>
+            <a:r>
+              <a:rPr lang="en-GB" sz="1700">
+                <a:solidFill>
+                  <a:srgbClr val="333333"/>
+                </a:solidFill>
+                <a:latin typeface="Calibri"/>
+                <a:ea typeface="Calibri"/>
+                <a:cs typeface="Calibri"/>
+                <a:sym typeface="Calibri"/>
+              </a:rPr>
+              <a:t> perfetto_trace_file </a:t>
+            </a:r>
+            <a:r>
+              <a:rPr b="1" lang="en-GB" sz="1700">
+                <a:solidFill>
+                  <a:srgbClr val="333333"/>
+                </a:solidFill>
+                <a:latin typeface="Calibri"/>
+                <a:ea typeface="Calibri"/>
+                <a:cs typeface="Calibri"/>
+                <a:sym typeface="Calibri"/>
+              </a:rPr>
+              <a:t>in</a:t>
+            </a:r>
+            <a:r>
+              <a:rPr lang="en-GB" sz="1700">
+                <a:solidFill>
+                  <a:srgbClr val="333333"/>
+                </a:solidFill>
+                <a:latin typeface="Calibri"/>
+                <a:ea typeface="Calibri"/>
+                <a:cs typeface="Calibri"/>
+                <a:sym typeface="Calibri"/>
+              </a:rPr>
+              <a:t> </a:t>
+            </a:r>
+            <a:r>
+              <a:rPr lang="en-GB" sz="1700">
+                <a:solidFill>
+                  <a:srgbClr val="0086B3"/>
+                </a:solidFill>
+                <a:latin typeface="Calibri"/>
+                <a:ea typeface="Calibri"/>
+                <a:cs typeface="Calibri"/>
+                <a:sym typeface="Calibri"/>
+              </a:rPr>
+              <a:t>os</a:t>
+            </a:r>
+            <a:r>
+              <a:rPr lang="en-GB" sz="1700">
+                <a:solidFill>
+                  <a:srgbClr val="333333"/>
+                </a:solidFill>
+                <a:latin typeface="Calibri"/>
+                <a:ea typeface="Calibri"/>
+                <a:cs typeface="Calibri"/>
+                <a:sym typeface="Calibri"/>
+              </a:rPr>
+              <a:t>.listdir(</a:t>
+            </a:r>
+            <a:r>
+              <a:rPr lang="en-GB" sz="1700">
+                <a:solidFill>
+                  <a:srgbClr val="0086B3"/>
+                </a:solidFill>
+                <a:latin typeface="Calibri"/>
+                <a:ea typeface="Calibri"/>
+                <a:cs typeface="Calibri"/>
+                <a:sym typeface="Calibri"/>
+              </a:rPr>
+              <a:t>path</a:t>
+            </a:r>
+            <a:r>
+              <a:rPr lang="en-GB" sz="1700">
+                <a:solidFill>
+                  <a:srgbClr val="333333"/>
+                </a:solidFill>
+                <a:latin typeface="Calibri"/>
+                <a:ea typeface="Calibri"/>
+                <a:cs typeface="Calibri"/>
+                <a:sym typeface="Calibri"/>
+              </a:rPr>
+              <a:t>):</a:t>
+            </a:r>
+            <a:br>
+              <a:rPr lang="en-GB" sz="1700">
+                <a:solidFill>
+                  <a:srgbClr val="333333"/>
+                </a:solidFill>
+                <a:latin typeface="Calibri"/>
+                <a:ea typeface="Calibri"/>
+                <a:cs typeface="Calibri"/>
+                <a:sym typeface="Calibri"/>
+              </a:rPr>
+            </a:br>
+            <a:r>
+              <a:rPr lang="en-GB" sz="1700">
+                <a:solidFill>
+                  <a:srgbClr val="333333"/>
+                </a:solidFill>
+                <a:latin typeface="Calibri"/>
+                <a:ea typeface="Calibri"/>
+                <a:cs typeface="Calibri"/>
+                <a:sym typeface="Calibri"/>
+              </a:rPr>
+              <a:t>    tp = TraceProcessor(trace=</a:t>
+            </a:r>
+            <a:r>
+              <a:rPr lang="en-GB" sz="1700">
+                <a:solidFill>
+                  <a:srgbClr val="0086B3"/>
+                </a:solidFill>
+                <a:latin typeface="Calibri"/>
+                <a:ea typeface="Calibri"/>
+                <a:cs typeface="Calibri"/>
+                <a:sym typeface="Calibri"/>
+              </a:rPr>
+              <a:t>os</a:t>
+            </a:r>
+            <a:r>
+              <a:rPr lang="en-GB" sz="1700">
+                <a:solidFill>
+                  <a:srgbClr val="333333"/>
+                </a:solidFill>
+                <a:latin typeface="Calibri"/>
+                <a:ea typeface="Calibri"/>
+                <a:cs typeface="Calibri"/>
+                <a:sym typeface="Calibri"/>
+              </a:rPr>
+              <a:t>.</a:t>
+            </a:r>
+            <a:r>
+              <a:rPr lang="en-GB" sz="1700">
+                <a:solidFill>
+                  <a:srgbClr val="0086B3"/>
+                </a:solidFill>
+                <a:latin typeface="Calibri"/>
+                <a:ea typeface="Calibri"/>
+                <a:cs typeface="Calibri"/>
+                <a:sym typeface="Calibri"/>
+              </a:rPr>
+              <a:t>path</a:t>
+            </a:r>
+            <a:r>
+              <a:rPr lang="en-GB" sz="1700">
+                <a:solidFill>
+                  <a:srgbClr val="333333"/>
+                </a:solidFill>
+                <a:latin typeface="Calibri"/>
+                <a:ea typeface="Calibri"/>
+                <a:cs typeface="Calibri"/>
+                <a:sym typeface="Calibri"/>
+              </a:rPr>
+              <a:t>.join(</a:t>
+            </a:r>
+            <a:r>
+              <a:rPr lang="en-GB" sz="1700">
+                <a:solidFill>
+                  <a:srgbClr val="0086B3"/>
+                </a:solidFill>
+                <a:latin typeface="Calibri"/>
+                <a:ea typeface="Calibri"/>
+                <a:cs typeface="Calibri"/>
+                <a:sym typeface="Calibri"/>
+              </a:rPr>
+              <a:t>path</a:t>
+            </a:r>
+            <a:r>
+              <a:rPr lang="en-GB" sz="1700">
+                <a:solidFill>
+                  <a:srgbClr val="333333"/>
+                </a:solidFill>
+                <a:latin typeface="Calibri"/>
+                <a:ea typeface="Calibri"/>
+                <a:cs typeface="Calibri"/>
+                <a:sym typeface="Calibri"/>
+              </a:rPr>
+              <a:t>, perfetto_trace_file))</a:t>
+            </a:r>
+            <a:br>
+              <a:rPr lang="en-GB" sz="1700">
+                <a:solidFill>
+                  <a:srgbClr val="333333"/>
+                </a:solidFill>
+                <a:latin typeface="Calibri"/>
+                <a:ea typeface="Calibri"/>
+                <a:cs typeface="Calibri"/>
+                <a:sym typeface="Calibri"/>
+              </a:rPr>
+            </a:br>
+            <a:r>
+              <a:rPr lang="en-GB" sz="1700">
+                <a:solidFill>
+                  <a:srgbClr val="333333"/>
+                </a:solidFill>
+                <a:latin typeface="Calibri"/>
+                <a:ea typeface="Calibri"/>
+                <a:cs typeface="Calibri"/>
+                <a:sym typeface="Calibri"/>
+              </a:rPr>
+              <a:t>    </a:t>
+            </a:r>
+            <a:br>
+              <a:rPr lang="en-GB" sz="1700">
+                <a:solidFill>
+                  <a:srgbClr val="333333"/>
+                </a:solidFill>
+                <a:latin typeface="Calibri"/>
+                <a:ea typeface="Calibri"/>
+                <a:cs typeface="Calibri"/>
+                <a:sym typeface="Calibri"/>
+              </a:rPr>
+            </a:br>
+            <a:r>
+              <a:rPr lang="en-GB" sz="1700">
+                <a:solidFill>
+                  <a:srgbClr val="333333"/>
+                </a:solidFill>
+                <a:latin typeface="Calibri"/>
+                <a:ea typeface="Calibri"/>
+                <a:cs typeface="Calibri"/>
+                <a:sym typeface="Calibri"/>
+              </a:rPr>
+              <a:t>    # The basic perfetto tables are: slices, counters, </a:t>
+            </a:r>
+            <a:r>
+              <a:rPr b="1" lang="en-GB" sz="1700">
+                <a:solidFill>
+                  <a:srgbClr val="333333"/>
+                </a:solidFill>
+                <a:latin typeface="Calibri"/>
+                <a:ea typeface="Calibri"/>
+                <a:cs typeface="Calibri"/>
+                <a:sym typeface="Calibri"/>
+              </a:rPr>
+              <a:t>and</a:t>
+            </a:r>
+            <a:r>
+              <a:rPr lang="en-GB" sz="1700">
+                <a:solidFill>
+                  <a:srgbClr val="333333"/>
+                </a:solidFill>
+                <a:latin typeface="Calibri"/>
+                <a:ea typeface="Calibri"/>
+                <a:cs typeface="Calibri"/>
+                <a:sym typeface="Calibri"/>
+              </a:rPr>
+              <a:t> tracks</a:t>
+            </a:r>
+            <a:br>
+              <a:rPr lang="en-GB" sz="1700">
+                <a:solidFill>
+                  <a:srgbClr val="333333"/>
+                </a:solidFill>
+                <a:latin typeface="Calibri"/>
+                <a:ea typeface="Calibri"/>
+                <a:cs typeface="Calibri"/>
+                <a:sym typeface="Calibri"/>
+              </a:rPr>
+            </a:br>
+            <a:r>
+              <a:rPr lang="en-GB" sz="1700">
+                <a:solidFill>
+                  <a:srgbClr val="333333"/>
+                </a:solidFill>
+                <a:latin typeface="Calibri"/>
+                <a:ea typeface="Calibri"/>
+                <a:cs typeface="Calibri"/>
+                <a:sym typeface="Calibri"/>
+              </a:rPr>
+              <a:t>    data = tp.query(</a:t>
+            </a:r>
+            <a:r>
+              <a:rPr lang="en-GB" sz="1700">
+                <a:solidFill>
+                  <a:srgbClr val="DD1144"/>
+                </a:solidFill>
+                <a:latin typeface="Calibri"/>
+                <a:ea typeface="Calibri"/>
+                <a:cs typeface="Calibri"/>
+                <a:sym typeface="Calibri"/>
+              </a:rPr>
+              <a:t>"SELECT * FROM counters"</a:t>
+            </a:r>
+            <a:r>
+              <a:rPr lang="en-GB" sz="1700">
+                <a:solidFill>
+                  <a:srgbClr val="333333"/>
+                </a:solidFill>
+                <a:latin typeface="Calibri"/>
+                <a:ea typeface="Calibri"/>
+                <a:cs typeface="Calibri"/>
+                <a:sym typeface="Calibri"/>
+              </a:rPr>
+              <a:t>).as_pandas_dataframe()</a:t>
+            </a:r>
+            <a:br>
+              <a:rPr lang="en-GB" sz="1700">
+                <a:solidFill>
+                  <a:srgbClr val="333333"/>
+                </a:solidFill>
+                <a:latin typeface="Calibri"/>
+                <a:ea typeface="Calibri"/>
+                <a:cs typeface="Calibri"/>
+                <a:sym typeface="Calibri"/>
+              </a:rPr>
+            </a:br>
+            <a:r>
+              <a:rPr lang="en-GB" sz="1700">
+                <a:solidFill>
+                  <a:srgbClr val="333333"/>
+                </a:solidFill>
+                <a:latin typeface="Calibri"/>
+                <a:ea typeface="Calibri"/>
+                <a:cs typeface="Calibri"/>
+                <a:sym typeface="Calibri"/>
+              </a:rPr>
+              <a:t>    data.to_csv(</a:t>
+            </a:r>
+            <a:r>
+              <a:rPr lang="en-GB" sz="1700">
+                <a:solidFill>
+                  <a:srgbClr val="0086B3"/>
+                </a:solidFill>
+                <a:latin typeface="Calibri"/>
+                <a:ea typeface="Calibri"/>
+                <a:cs typeface="Calibri"/>
+                <a:sym typeface="Calibri"/>
+              </a:rPr>
+              <a:t>os</a:t>
+            </a:r>
+            <a:r>
+              <a:rPr lang="en-GB" sz="1700">
+                <a:solidFill>
+                  <a:srgbClr val="333333"/>
+                </a:solidFill>
+                <a:latin typeface="Calibri"/>
+                <a:ea typeface="Calibri"/>
+                <a:cs typeface="Calibri"/>
+                <a:sym typeface="Calibri"/>
+              </a:rPr>
+              <a:t>.</a:t>
+            </a:r>
+            <a:r>
+              <a:rPr lang="en-GB" sz="1700">
+                <a:solidFill>
+                  <a:srgbClr val="0086B3"/>
+                </a:solidFill>
+                <a:latin typeface="Calibri"/>
+                <a:ea typeface="Calibri"/>
+                <a:cs typeface="Calibri"/>
+                <a:sym typeface="Calibri"/>
+              </a:rPr>
+              <a:t>path</a:t>
+            </a:r>
+            <a:r>
+              <a:rPr lang="en-GB" sz="1700">
+                <a:solidFill>
+                  <a:srgbClr val="333333"/>
+                </a:solidFill>
+                <a:latin typeface="Calibri"/>
+                <a:ea typeface="Calibri"/>
+                <a:cs typeface="Calibri"/>
+                <a:sym typeface="Calibri"/>
+              </a:rPr>
+              <a:t>.join(</a:t>
+            </a:r>
+            <a:r>
+              <a:rPr lang="en-GB" sz="1700">
+                <a:solidFill>
+                  <a:srgbClr val="0086B3"/>
+                </a:solidFill>
+                <a:latin typeface="Calibri"/>
+                <a:ea typeface="Calibri"/>
+                <a:cs typeface="Calibri"/>
+                <a:sym typeface="Calibri"/>
+              </a:rPr>
+              <a:t>path</a:t>
+            </a:r>
+            <a:r>
+              <a:rPr lang="en-GB" sz="1700">
+                <a:solidFill>
+                  <a:srgbClr val="333333"/>
+                </a:solidFill>
+                <a:latin typeface="Calibri"/>
+                <a:ea typeface="Calibri"/>
+                <a:cs typeface="Calibri"/>
+                <a:sym typeface="Calibri"/>
+              </a:rPr>
+              <a:t>,</a:t>
+            </a:r>
+            <a:r>
+              <a:rPr lang="en-GB" sz="1700">
+                <a:solidFill>
+                  <a:srgbClr val="333333"/>
+                </a:solidFill>
+                <a:latin typeface="Calibri"/>
+                <a:ea typeface="Calibri"/>
+                <a:cs typeface="Calibri"/>
+                <a:sym typeface="Calibri"/>
+              </a:rPr>
+              <a:t> </a:t>
+            </a:r>
+            <a:r>
+              <a:rPr lang="en-GB" sz="1700">
+                <a:solidFill>
+                  <a:srgbClr val="333333"/>
+                </a:solidFill>
+                <a:latin typeface="Calibri"/>
+                <a:ea typeface="Calibri"/>
+                <a:cs typeface="Calibri"/>
+                <a:sym typeface="Calibri"/>
+              </a:rPr>
+              <a:t>f</a:t>
+            </a:r>
+            <a:r>
+              <a:rPr lang="en-GB" sz="1700">
+                <a:solidFill>
+                  <a:srgbClr val="DD1144"/>
+                </a:solidFill>
+                <a:latin typeface="Calibri"/>
+                <a:ea typeface="Calibri"/>
+                <a:cs typeface="Calibri"/>
+                <a:sym typeface="Calibri"/>
+              </a:rPr>
+              <a:t>"{perfetto_trace_file.split("</a:t>
+            </a:r>
+            <a:r>
+              <a:rPr lang="en-GB" sz="1700">
+                <a:solidFill>
+                  <a:srgbClr val="333333"/>
+                </a:solidFill>
+                <a:latin typeface="Calibri"/>
+                <a:ea typeface="Calibri"/>
+                <a:cs typeface="Calibri"/>
+                <a:sym typeface="Calibri"/>
+              </a:rPr>
+              <a:t>.</a:t>
+            </a:r>
+            <a:r>
+              <a:rPr lang="en-GB" sz="1700">
+                <a:solidFill>
+                  <a:srgbClr val="DD1144"/>
+                </a:solidFill>
+                <a:latin typeface="Calibri"/>
+                <a:ea typeface="Calibri"/>
+                <a:cs typeface="Calibri"/>
+                <a:sym typeface="Calibri"/>
+              </a:rPr>
+              <a:t>")[0]}_aggregated.csv"</a:t>
+            </a:r>
+            <a:r>
+              <a:rPr lang="en-GB" sz="1700">
+                <a:solidFill>
+                  <a:srgbClr val="333333"/>
+                </a:solidFill>
+                <a:latin typeface="Calibri"/>
+                <a:ea typeface="Calibri"/>
+                <a:cs typeface="Calibri"/>
+                <a:sym typeface="Calibri"/>
+              </a:rPr>
+              <a:t>)):w</a:t>
+            </a:r>
+            <a:endParaRPr sz="1700">
+              <a:solidFill>
+                <a:srgbClr val="333333"/>
+              </a:solidFill>
+              <a:latin typeface="Calibri"/>
+              <a:ea typeface="Calibri"/>
+              <a:cs typeface="Calibri"/>
+              <a:sym typeface="Calibri"/>
+            </a:endParaRPr>
+          </a:p>
+          <a:p>
+            <a:pPr indent="0" lvl="0" marL="0" rtl="0" algn="l">
+              <a:lnSpc>
+                <a:spcPct val="115000"/>
+              </a:lnSpc>
+              <a:spcBef>
+                <a:spcPts val="0"/>
+              </a:spcBef>
+              <a:spcAft>
+                <a:spcPts val="0"/>
+              </a:spcAft>
+              <a:buClr>
+                <a:schemeClr val="dk1"/>
+              </a:buClr>
+              <a:buSzPts val="1100"/>
+              <a:buFont typeface="Arial"/>
+              <a:buNone/>
+            </a:pPr>
+            <a:r>
+              <a:t/>
+            </a:r>
+            <a:endParaRPr sz="1700">
+              <a:solidFill>
+                <a:srgbClr val="333333"/>
+              </a:solidFill>
               <a:latin typeface="Calibri"/>
               <a:ea typeface="Calibri"/>
               <a:cs typeface="Calibri"/>
@@ -8855,7 +11529,7 @@
                 <a:cs typeface="Courier New"/>
                 <a:sym typeface="Courier New"/>
               </a:rPr>
-              <a:t>A Linux, MacOS or Windows PC </a:t>
+              <a:t>A laptop with Linux, MacOS or Windows</a:t>
             </a:r>
             <a:endParaRPr sz="2000">
               <a:solidFill>
@@ -8901,7 +11575,7 @@
                 <a:cs typeface="Courier New"/>
                 <a:sym typeface="Courier New"/>
               </a:rPr>
-              <a:t>python 3.11+</a:t>
+              <a:t>Python 3.11+</a:t>
             </a:r>
             <a:endParaRPr sz="2000">
               <a:solidFill>
@@ -8947,7 +11621,23 @@
                 <a:cs typeface="Courier New"/>
                 <a:sym typeface="Courier New"/>
               </a:rPr>
-              <a:t>Android development tools</a:t>
+              <a:t>Android </a:t>
+            </a:r>
+            <a:r>
+              <a:rPr lang="en-GB" sz="2000" u="sng">
+                <a:solidFill>
+                  <a:schemeClr val="hlink"/>
+                </a:solidFill>
+                <a:highlight>
+                  <a:srgbClr val="FFFFFF"/>
+                </a:highlight>
+                <a:latin typeface="Courier New"/>
+                <a:ea typeface="Courier New"/>
+                <a:cs typeface="Courier New"/>
+                <a:sym typeface="Courier New"/>
+                <a:hlinkClick r:id="rId3"/>
+              </a:rPr>
+              <a:t>development tools</a:t>
             </a:r>
             <a:endParaRPr sz="2000">
               <a:solidFill>
@@ -9047,9 +11737,9 @@
                 <a:ea typeface="Calibri"/>
                 <a:cs typeface="Calibri"/>
                 <a:sym typeface="Calibri"/>
-                <a:hlinkClick r:id="rId3"/>
-              </a:rPr>
-              <a:t>https://github.com/S2-group/green-lab/tree/main</a:t>
+                <a:hlinkClick r:id="rId4"/>
+              </a:rPr>
+              <a:t>https://github.com/S2-group/green-lab</a:t>
             </a:r>
             <a:endParaRPr sz="2000">
               <a:latin typeface="Calibri"/>
@@ -10029,8 +12719,8 @@
         </p:nvSpPr>
         <p:spPr>
           <a:xfrm>
-            <a:off x="422412" y="1478383"/>
-            <a:ext cx="7509476" cy="4677868"/>
+            <a:off x="422398" y="1478375"/>
+            <a:ext cx="8464500" cy="4677900"/>
           </a:xfrm>
           <a:prstGeom prst="rect">
             <a:avLst/>
@@ -10677,7 +13367,7 @@
               </a:buClr>
               <a:buSzPts val="2000"/>
               <a:buFont typeface="Courier New"/>
-              <a:buChar char="-"/>
+              <a:buAutoNum type="arabicPeriod"/>
             </a:pPr>
             <a:r>
               <a:rPr lang="en-GB" sz="2000">
@@ -10723,7 +13413,7 @@
               </a:buClr>
               <a:buSzPts val="2000"/>
               <a:buFont typeface="Courier New"/>
-              <a:buChar char="-"/>
+              <a:buAutoNum type="arabicPeriod"/>
             </a:pPr>
             <a:r>
               <a:rPr lang="en-GB" sz="2000">
@@ -10769,7 +13459,7 @@
               </a:buClr>
               <a:buSzPts val="2000"/>
               <a:buFont typeface="Courier New"/>
-              <a:buChar char="-"/>
+              <a:buAutoNum type="arabicPeriod"/>
             </a:pPr>
             <a:r>
               <a:rPr lang="en-GB" sz="2000">
@@ -10784,7 +13474,23 @@
                 <a:cs typeface="Courier New"/>
                 <a:sym typeface="Courier New"/>
               </a:rPr>
-              <a:t>Install adb</a:t>
+              <a:t>Install </a:t>
+            </a:r>
+            <a:r>
+              <a:rPr lang="en-GB" sz="2000" u="sng">
+                <a:solidFill>
+                  <a:schemeClr val="hlink"/>
+                </a:solidFill>
+                <a:highlight>
+                  <a:srgbClr val="FFFFFF"/>
+                </a:highlight>
+                <a:latin typeface="Courier New"/>
+                <a:ea typeface="Courier New"/>
+                <a:cs typeface="Courier New"/>
+                <a:sym typeface="Courier New"/>
+                <a:hlinkClick r:id="rId3"/>
+              </a:rPr>
+              <a:t>adb</a:t>
             </a:r>
             <a:endParaRPr sz="2000">
               <a:solidFill>
@@ -10815,7 +13521,7 @@
               </a:buClr>
               <a:buSzPts val="2000"/>
               <a:buFont typeface="Courier New"/>
-              <a:buChar char="-"/>
+              <a:buAutoNum type="arabicPeriod"/>
             </a:pPr>
             <a:r>
               <a:rPr lang="en-GB" sz="2000">
@@ -10830,7 +13536,23 @@
                 <a:cs typeface="Courier New"/>
                 <a:sym typeface="Courier New"/>
               </a:rPr>
-              <a:t>Install android sdkmanager</a:t>
+              <a:t>Install android </a:t>
+            </a:r>
+            <a:r>
+              <a:rPr lang="en-GB" sz="2000" u="sng">
+                <a:solidFill>
+                  <a:schemeClr val="hlink"/>
+                </a:solidFill>
+                <a:highlight>
+                  <a:srgbClr val="FFFFFF"/>
+                </a:highlight>
+                <a:latin typeface="Courier New"/>
+                <a:ea typeface="Courier New"/>
+                <a:cs typeface="Courier New"/>
+                <a:sym typeface="Courier New"/>
+                <a:hlinkClick r:id="rId4"/>
+              </a:rPr>
+              <a:t>sdkmanager</a:t>
             </a:r>
             <a:endParaRPr sz="2000">
               <a:solidFill>
@@ -10922,7 +13644,23 @@
                 <a:cs typeface="Courier New"/>
                 <a:sym typeface="Courier New"/>
               </a:rPr>
-              <a:t>Android avdmanager</a:t>
+              <a:t>Android </a:t>
+            </a:r>
+            <a:r>
+              <a:rPr lang="en-GB" sz="2000" u="sng">
+                <a:solidFill>
+                  <a:schemeClr val="hlink"/>
+                </a:solidFill>
+                <a:highlight>
+                  <a:srgbClr val="FFFFFF"/>
+                </a:highlight>
+                <a:latin typeface="Courier New"/>
+                <a:ea typeface="Courier New"/>
+                <a:cs typeface="Courier New"/>
+                <a:sym typeface="Courier New"/>
+                <a:hlinkClick r:id="rId5"/>
+              </a:rPr>
+              <a:t>avdmanager</a:t>
             </a:r>
             <a:endParaRPr sz="2000">
               <a:solidFill>
@@ -10968,7 +13706,38 @@
                 <a:cs typeface="Courier New"/>
                 <a:sym typeface="Courier New"/>
               </a:rPr>
-              <a:t>Android emulator</a:t>
+              <a:t>Android </a:t>
+            </a:r>
+            <a:r>
+              <a:rPr lang="en-GB" sz="2000" u="sng">
+                <a:solidFill>
+                  <a:schemeClr val="hlink"/>
+                </a:solidFill>
+                <a:highlight>
+                  <a:srgbClr val="FFFFFF"/>
+                </a:highlight>
+                <a:latin typeface="Courier New"/>
+                <a:ea typeface="Courier New"/>
+                <a:cs typeface="Courier New"/>
+                <a:sym typeface="Courier New"/>
+                <a:hlinkClick r:id="rId6"/>
+              </a:rPr>
+              <a:t>emulator</a:t>
+            </a:r>
+            <a:r>
+              <a:rPr lang="en-GB" sz="2000">
+                <a:solidFill>
+                  <a:srgbClr val="1F2328"/>
+                </a:solidFill>
+                <a:highlight>
+                  <a:srgbClr val="FFFFFF"/>
+                </a:highlight>
+                <a:latin typeface="Courier New"/>
+                <a:ea typeface="Courier New"/>
+                <a:cs typeface="Courier New"/>
+                <a:sym typeface="Courier New"/>
+              </a:rPr>
+              <a:t> (the tool is called emulator)</a:t>
             </a:r>
             <a:endParaRPr b="1" sz="2000">
               <a:solidFill>
@@ -11613,7 +14382,25 @@
                 <a:cs typeface="Courier New"/>
                 <a:sym typeface="Courier New"/>
               </a:rPr>
-              <a:t>adb shell</a:t>
+              <a:t>adb shell </a:t>
+            </a:r>
+            <a:r>
+              <a:rPr lang="en-GB" sz="2000">
+                <a:latin typeface="Calibri"/>
+                <a:ea typeface="Calibri"/>
+                <a:cs typeface="Calibri"/>
+                <a:sym typeface="Calibri"/>
+              </a:rPr>
+              <a:t>e.g.</a:t>
+            </a:r>
+            <a:r>
+              <a:rPr lang="en-GB" sz="1700">
+                <a:latin typeface="Courier New"/>
+                <a:ea typeface="Courier New"/>
+                <a:cs typeface="Courier New"/>
+                <a:sym typeface="Courier New"/>
+              </a:rPr>
+              <a:t> adb shell ls</a:t>
             </a:r>
             <a:endParaRPr sz="2200">
               <a:latin typeface="Calibri"/>

</xml_diff>